<commit_message>
Criei os 7 primeiros slides
</commit_message>
<xml_diff>
--- a/Desafio2.pptx
+++ b/Desafio2.pptx
@@ -6,9 +6,16 @@
   </p:sldMasterIdLst>
   <p:sldIdLst>
     <p:sldId id="256" r:id="rId2"/>
+    <p:sldId id="257" r:id="rId3"/>
+    <p:sldId id="258" r:id="rId4"/>
+    <p:sldId id="259" r:id="rId5"/>
+    <p:sldId id="260" r:id="rId6"/>
+    <p:sldId id="261" r:id="rId7"/>
+    <p:sldId id="262" r:id="rId8"/>
+    <p:sldId id="263" r:id="rId9"/>
   </p:sldIdLst>
   <p:notesMasterIdLst>
-    <p:notesMasterId r:id="rId3"/>
+    <p:notesMasterId r:id="rId10"/>
   </p:notesMasterIdLst>
   <p:sldSz cx="9144000" cy="5143500"/>
   <p:notesSz cx="5143500" cy="9144000"/>
@@ -544,6 +551,622 @@
 </p:notes>
 </file>
 
+<file path=ppt/notesSlides/notesSlide2.xml><?xml version="1.0" encoding="utf-8"?>
+<p:notes xmlns:a="http://schemas.openxmlformats.org/drawingml/2006/main" xmlns:r="http://schemas.openxmlformats.org/officeDocument/2006/relationships" xmlns:p="http://schemas.openxmlformats.org/presentationml/2006/main">
+  <p:cSld>
+    <p:spTree>
+      <p:nvGrpSpPr>
+        <p:cNvPr id="1" name=""/>
+        <p:cNvGrpSpPr/>
+        <p:nvPr/>
+      </p:nvGrpSpPr>
+      <p:grpSpPr>
+        <a:xfrm>
+          <a:off x="0" y="0"/>
+          <a:ext cx="0" cy="0"/>
+          <a:chOff x="0" y="0"/>
+          <a:chExt cx="0" cy="0"/>
+        </a:xfrm>
+      </p:grpSpPr>
+      <p:sp>
+        <p:nvSpPr>
+          <p:cNvPr id="2" name="Slide Image Placeholder 1"/>
+          <p:cNvSpPr>
+            <a:spLocks noGrp="1" noRot="1" noChangeAspect="1"/>
+          </p:cNvSpPr>
+          <p:nvPr>
+            <p:ph type="sldImg"/>
+          </p:nvPr>
+        </p:nvSpPr>
+        <p:spPr/>
+      </p:sp>
+      <p:sp>
+        <p:nvSpPr>
+          <p:cNvPr id="3" name="Notes Placeholder 2"/>
+          <p:cNvSpPr>
+            <a:spLocks noGrp="1"/>
+          </p:cNvSpPr>
+          <p:nvPr>
+            <p:ph type="body" idx="1"/>
+          </p:nvPr>
+        </p:nvSpPr>
+        <p:spPr/>
+        <p:txBody>
+          <a:bodyPr/>
+          <a:lstStyle/>
+          <a:p>
+            <a:r>
+              <a:rPr lang="en-US" dirty="0"/>
+              <a:t/>
+            </a:r>
+            <a:endParaRPr lang="en-US" dirty="0"/>
+          </a:p>
+        </p:txBody>
+      </p:sp>
+      <p:sp>
+        <p:nvSpPr>
+          <p:cNvPr id="4" name="Slide Number Placeholder 3"/>
+          <p:cNvSpPr>
+            <a:spLocks noGrp="1"/>
+          </p:cNvSpPr>
+          <p:nvPr>
+            <p:ph type="sldNum" sz="quarter" idx="10"/>
+          </p:nvPr>
+        </p:nvSpPr>
+        <p:spPr/>
+        <p:txBody>
+          <a:bodyPr/>
+          <a:lstStyle/>
+          <a:p>
+            <a:fld id="{F7021451-1387-4CA6-816F-3879F97B5CBC}" type="slidenum">
+              <a:rPr lang="en-US"/>
+              <a:t>2</a:t>
+            </a:fld>
+            <a:endParaRPr lang="en-US"/>
+          </a:p>
+        </p:txBody>
+      </p:sp>
+    </p:spTree>
+    <p:extLst>
+      <p:ext uri="{BB962C8B-B14F-4D97-AF65-F5344CB8AC3E}">
+        <p14:creationId xmlns:p14="http://schemas.microsoft.com/office/powerpoint/2010/main" val="1024086991"/>
+      </p:ext>
+    </p:extLst>
+  </p:cSld>
+  <p:clrMapOvr>
+    <a:masterClrMapping/>
+  </p:clrMapOvr>
+</p:notes>
+</file>
+
+<file path=ppt/notesSlides/notesSlide3.xml><?xml version="1.0" encoding="utf-8"?>
+<p:notes xmlns:a="http://schemas.openxmlformats.org/drawingml/2006/main" xmlns:r="http://schemas.openxmlformats.org/officeDocument/2006/relationships" xmlns:p="http://schemas.openxmlformats.org/presentationml/2006/main">
+  <p:cSld>
+    <p:spTree>
+      <p:nvGrpSpPr>
+        <p:cNvPr id="1" name=""/>
+        <p:cNvGrpSpPr/>
+        <p:nvPr/>
+      </p:nvGrpSpPr>
+      <p:grpSpPr>
+        <a:xfrm>
+          <a:off x="0" y="0"/>
+          <a:ext cx="0" cy="0"/>
+          <a:chOff x="0" y="0"/>
+          <a:chExt cx="0" cy="0"/>
+        </a:xfrm>
+      </p:grpSpPr>
+      <p:sp>
+        <p:nvSpPr>
+          <p:cNvPr id="2" name="Slide Image Placeholder 1"/>
+          <p:cNvSpPr>
+            <a:spLocks noGrp="1" noRot="1" noChangeAspect="1"/>
+          </p:cNvSpPr>
+          <p:nvPr>
+            <p:ph type="sldImg"/>
+          </p:nvPr>
+        </p:nvSpPr>
+        <p:spPr/>
+      </p:sp>
+      <p:sp>
+        <p:nvSpPr>
+          <p:cNvPr id="3" name="Notes Placeholder 2"/>
+          <p:cNvSpPr>
+            <a:spLocks noGrp="1"/>
+          </p:cNvSpPr>
+          <p:nvPr>
+            <p:ph type="body" idx="1"/>
+          </p:nvPr>
+        </p:nvSpPr>
+        <p:spPr/>
+        <p:txBody>
+          <a:bodyPr/>
+          <a:lstStyle/>
+          <a:p>
+            <a:r>
+              <a:rPr lang="en-US" dirty="0"/>
+              <a:t/>
+            </a:r>
+            <a:endParaRPr lang="en-US" dirty="0"/>
+          </a:p>
+        </p:txBody>
+      </p:sp>
+      <p:sp>
+        <p:nvSpPr>
+          <p:cNvPr id="4" name="Slide Number Placeholder 3"/>
+          <p:cNvSpPr>
+            <a:spLocks noGrp="1"/>
+          </p:cNvSpPr>
+          <p:nvPr>
+            <p:ph type="sldNum" sz="quarter" idx="10"/>
+          </p:nvPr>
+        </p:nvSpPr>
+        <p:spPr/>
+        <p:txBody>
+          <a:bodyPr/>
+          <a:lstStyle/>
+          <a:p>
+            <a:fld id="{F7021451-1387-4CA6-816F-3879F97B5CBC}" type="slidenum">
+              <a:rPr lang="en-US"/>
+              <a:t>3</a:t>
+            </a:fld>
+            <a:endParaRPr lang="en-US"/>
+          </a:p>
+        </p:txBody>
+      </p:sp>
+    </p:spTree>
+    <p:extLst>
+      <p:ext uri="{BB962C8B-B14F-4D97-AF65-F5344CB8AC3E}">
+        <p14:creationId xmlns:p14="http://schemas.microsoft.com/office/powerpoint/2010/main" val="1024086991"/>
+      </p:ext>
+    </p:extLst>
+  </p:cSld>
+  <p:clrMapOvr>
+    <a:masterClrMapping/>
+  </p:clrMapOvr>
+</p:notes>
+</file>
+
+<file path=ppt/notesSlides/notesSlide4.xml><?xml version="1.0" encoding="utf-8"?>
+<p:notes xmlns:a="http://schemas.openxmlformats.org/drawingml/2006/main" xmlns:r="http://schemas.openxmlformats.org/officeDocument/2006/relationships" xmlns:p="http://schemas.openxmlformats.org/presentationml/2006/main">
+  <p:cSld>
+    <p:spTree>
+      <p:nvGrpSpPr>
+        <p:cNvPr id="1" name=""/>
+        <p:cNvGrpSpPr/>
+        <p:nvPr/>
+      </p:nvGrpSpPr>
+      <p:grpSpPr>
+        <a:xfrm>
+          <a:off x="0" y="0"/>
+          <a:ext cx="0" cy="0"/>
+          <a:chOff x="0" y="0"/>
+          <a:chExt cx="0" cy="0"/>
+        </a:xfrm>
+      </p:grpSpPr>
+      <p:sp>
+        <p:nvSpPr>
+          <p:cNvPr id="2" name="Slide Image Placeholder 1"/>
+          <p:cNvSpPr>
+            <a:spLocks noGrp="1" noRot="1" noChangeAspect="1"/>
+          </p:cNvSpPr>
+          <p:nvPr>
+            <p:ph type="sldImg"/>
+          </p:nvPr>
+        </p:nvSpPr>
+        <p:spPr/>
+      </p:sp>
+      <p:sp>
+        <p:nvSpPr>
+          <p:cNvPr id="3" name="Notes Placeholder 2"/>
+          <p:cNvSpPr>
+            <a:spLocks noGrp="1"/>
+          </p:cNvSpPr>
+          <p:nvPr>
+            <p:ph type="body" idx="1"/>
+          </p:nvPr>
+        </p:nvSpPr>
+        <p:spPr/>
+        <p:txBody>
+          <a:bodyPr/>
+          <a:lstStyle/>
+          <a:p>
+            <a:r>
+              <a:rPr lang="en-US" dirty="0"/>
+              <a:t/>
+            </a:r>
+            <a:endParaRPr lang="en-US" dirty="0"/>
+          </a:p>
+        </p:txBody>
+      </p:sp>
+      <p:sp>
+        <p:nvSpPr>
+          <p:cNvPr id="4" name="Slide Number Placeholder 3"/>
+          <p:cNvSpPr>
+            <a:spLocks noGrp="1"/>
+          </p:cNvSpPr>
+          <p:nvPr>
+            <p:ph type="sldNum" sz="quarter" idx="10"/>
+          </p:nvPr>
+        </p:nvSpPr>
+        <p:spPr/>
+        <p:txBody>
+          <a:bodyPr/>
+          <a:lstStyle/>
+          <a:p>
+            <a:fld id="{F7021451-1387-4CA6-816F-3879F97B5CBC}" type="slidenum">
+              <a:rPr lang="en-US"/>
+              <a:t>4</a:t>
+            </a:fld>
+            <a:endParaRPr lang="en-US"/>
+          </a:p>
+        </p:txBody>
+      </p:sp>
+    </p:spTree>
+    <p:extLst>
+      <p:ext uri="{BB962C8B-B14F-4D97-AF65-F5344CB8AC3E}">
+        <p14:creationId xmlns:p14="http://schemas.microsoft.com/office/powerpoint/2010/main" val="1024086991"/>
+      </p:ext>
+    </p:extLst>
+  </p:cSld>
+  <p:clrMapOvr>
+    <a:masterClrMapping/>
+  </p:clrMapOvr>
+</p:notes>
+</file>
+
+<file path=ppt/notesSlides/notesSlide5.xml><?xml version="1.0" encoding="utf-8"?>
+<p:notes xmlns:a="http://schemas.openxmlformats.org/drawingml/2006/main" xmlns:r="http://schemas.openxmlformats.org/officeDocument/2006/relationships" xmlns:p="http://schemas.openxmlformats.org/presentationml/2006/main">
+  <p:cSld>
+    <p:spTree>
+      <p:nvGrpSpPr>
+        <p:cNvPr id="1" name=""/>
+        <p:cNvGrpSpPr/>
+        <p:nvPr/>
+      </p:nvGrpSpPr>
+      <p:grpSpPr>
+        <a:xfrm>
+          <a:off x="0" y="0"/>
+          <a:ext cx="0" cy="0"/>
+          <a:chOff x="0" y="0"/>
+          <a:chExt cx="0" cy="0"/>
+        </a:xfrm>
+      </p:grpSpPr>
+      <p:sp>
+        <p:nvSpPr>
+          <p:cNvPr id="2" name="Slide Image Placeholder 1"/>
+          <p:cNvSpPr>
+            <a:spLocks noGrp="1" noRot="1" noChangeAspect="1"/>
+          </p:cNvSpPr>
+          <p:nvPr>
+            <p:ph type="sldImg"/>
+          </p:nvPr>
+        </p:nvSpPr>
+        <p:spPr/>
+      </p:sp>
+      <p:sp>
+        <p:nvSpPr>
+          <p:cNvPr id="3" name="Notes Placeholder 2"/>
+          <p:cNvSpPr>
+            <a:spLocks noGrp="1"/>
+          </p:cNvSpPr>
+          <p:nvPr>
+            <p:ph type="body" idx="1"/>
+          </p:nvPr>
+        </p:nvSpPr>
+        <p:spPr/>
+        <p:txBody>
+          <a:bodyPr/>
+          <a:lstStyle/>
+          <a:p>
+            <a:r>
+              <a:rPr lang="en-US" dirty="0"/>
+              <a:t/>
+            </a:r>
+            <a:endParaRPr lang="en-US" dirty="0"/>
+          </a:p>
+        </p:txBody>
+      </p:sp>
+      <p:sp>
+        <p:nvSpPr>
+          <p:cNvPr id="4" name="Slide Number Placeholder 3"/>
+          <p:cNvSpPr>
+            <a:spLocks noGrp="1"/>
+          </p:cNvSpPr>
+          <p:nvPr>
+            <p:ph type="sldNum" sz="quarter" idx="10"/>
+          </p:nvPr>
+        </p:nvSpPr>
+        <p:spPr/>
+        <p:txBody>
+          <a:bodyPr/>
+          <a:lstStyle/>
+          <a:p>
+            <a:fld id="{F7021451-1387-4CA6-816F-3879F97B5CBC}" type="slidenum">
+              <a:rPr lang="en-US"/>
+              <a:t>5</a:t>
+            </a:fld>
+            <a:endParaRPr lang="en-US"/>
+          </a:p>
+        </p:txBody>
+      </p:sp>
+    </p:spTree>
+    <p:extLst>
+      <p:ext uri="{BB962C8B-B14F-4D97-AF65-F5344CB8AC3E}">
+        <p14:creationId xmlns:p14="http://schemas.microsoft.com/office/powerpoint/2010/main" val="1024086991"/>
+      </p:ext>
+    </p:extLst>
+  </p:cSld>
+  <p:clrMapOvr>
+    <a:masterClrMapping/>
+  </p:clrMapOvr>
+</p:notes>
+</file>
+
+<file path=ppt/notesSlides/notesSlide6.xml><?xml version="1.0" encoding="utf-8"?>
+<p:notes xmlns:a="http://schemas.openxmlformats.org/drawingml/2006/main" xmlns:r="http://schemas.openxmlformats.org/officeDocument/2006/relationships" xmlns:p="http://schemas.openxmlformats.org/presentationml/2006/main">
+  <p:cSld>
+    <p:spTree>
+      <p:nvGrpSpPr>
+        <p:cNvPr id="1" name=""/>
+        <p:cNvGrpSpPr/>
+        <p:nvPr/>
+      </p:nvGrpSpPr>
+      <p:grpSpPr>
+        <a:xfrm>
+          <a:off x="0" y="0"/>
+          <a:ext cx="0" cy="0"/>
+          <a:chOff x="0" y="0"/>
+          <a:chExt cx="0" cy="0"/>
+        </a:xfrm>
+      </p:grpSpPr>
+      <p:sp>
+        <p:nvSpPr>
+          <p:cNvPr id="2" name="Slide Image Placeholder 1"/>
+          <p:cNvSpPr>
+            <a:spLocks noGrp="1" noRot="1" noChangeAspect="1"/>
+          </p:cNvSpPr>
+          <p:nvPr>
+            <p:ph type="sldImg"/>
+          </p:nvPr>
+        </p:nvSpPr>
+        <p:spPr/>
+      </p:sp>
+      <p:sp>
+        <p:nvSpPr>
+          <p:cNvPr id="3" name="Notes Placeholder 2"/>
+          <p:cNvSpPr>
+            <a:spLocks noGrp="1"/>
+          </p:cNvSpPr>
+          <p:nvPr>
+            <p:ph type="body" idx="1"/>
+          </p:nvPr>
+        </p:nvSpPr>
+        <p:spPr/>
+        <p:txBody>
+          <a:bodyPr/>
+          <a:lstStyle/>
+          <a:p>
+            <a:r>
+              <a:rPr lang="en-US" dirty="0"/>
+              <a:t/>
+            </a:r>
+            <a:endParaRPr lang="en-US" dirty="0"/>
+          </a:p>
+        </p:txBody>
+      </p:sp>
+      <p:sp>
+        <p:nvSpPr>
+          <p:cNvPr id="4" name="Slide Number Placeholder 3"/>
+          <p:cNvSpPr>
+            <a:spLocks noGrp="1"/>
+          </p:cNvSpPr>
+          <p:nvPr>
+            <p:ph type="sldNum" sz="quarter" idx="10"/>
+          </p:nvPr>
+        </p:nvSpPr>
+        <p:spPr/>
+        <p:txBody>
+          <a:bodyPr/>
+          <a:lstStyle/>
+          <a:p>
+            <a:fld id="{F7021451-1387-4CA6-816F-3879F97B5CBC}" type="slidenum">
+              <a:rPr lang="en-US"/>
+              <a:t>6</a:t>
+            </a:fld>
+            <a:endParaRPr lang="en-US"/>
+          </a:p>
+        </p:txBody>
+      </p:sp>
+    </p:spTree>
+    <p:extLst>
+      <p:ext uri="{BB962C8B-B14F-4D97-AF65-F5344CB8AC3E}">
+        <p14:creationId xmlns:p14="http://schemas.microsoft.com/office/powerpoint/2010/main" val="1024086991"/>
+      </p:ext>
+    </p:extLst>
+  </p:cSld>
+  <p:clrMapOvr>
+    <a:masterClrMapping/>
+  </p:clrMapOvr>
+</p:notes>
+</file>
+
+<file path=ppt/notesSlides/notesSlide7.xml><?xml version="1.0" encoding="utf-8"?>
+<p:notes xmlns:a="http://schemas.openxmlformats.org/drawingml/2006/main" xmlns:r="http://schemas.openxmlformats.org/officeDocument/2006/relationships" xmlns:p="http://schemas.openxmlformats.org/presentationml/2006/main">
+  <p:cSld>
+    <p:spTree>
+      <p:nvGrpSpPr>
+        <p:cNvPr id="1" name=""/>
+        <p:cNvGrpSpPr/>
+        <p:nvPr/>
+      </p:nvGrpSpPr>
+      <p:grpSpPr>
+        <a:xfrm>
+          <a:off x="0" y="0"/>
+          <a:ext cx="0" cy="0"/>
+          <a:chOff x="0" y="0"/>
+          <a:chExt cx="0" cy="0"/>
+        </a:xfrm>
+      </p:grpSpPr>
+      <p:sp>
+        <p:nvSpPr>
+          <p:cNvPr id="2" name="Slide Image Placeholder 1"/>
+          <p:cNvSpPr>
+            <a:spLocks noGrp="1" noRot="1" noChangeAspect="1"/>
+          </p:cNvSpPr>
+          <p:nvPr>
+            <p:ph type="sldImg"/>
+          </p:nvPr>
+        </p:nvSpPr>
+        <p:spPr/>
+      </p:sp>
+      <p:sp>
+        <p:nvSpPr>
+          <p:cNvPr id="3" name="Notes Placeholder 2"/>
+          <p:cNvSpPr>
+            <a:spLocks noGrp="1"/>
+          </p:cNvSpPr>
+          <p:nvPr>
+            <p:ph type="body" idx="1"/>
+          </p:nvPr>
+        </p:nvSpPr>
+        <p:spPr/>
+        <p:txBody>
+          <a:bodyPr/>
+          <a:lstStyle/>
+          <a:p>
+            <a:r>
+              <a:rPr lang="en-US" dirty="0"/>
+              <a:t/>
+            </a:r>
+            <a:endParaRPr lang="en-US" dirty="0"/>
+          </a:p>
+        </p:txBody>
+      </p:sp>
+      <p:sp>
+        <p:nvSpPr>
+          <p:cNvPr id="4" name="Slide Number Placeholder 3"/>
+          <p:cNvSpPr>
+            <a:spLocks noGrp="1"/>
+          </p:cNvSpPr>
+          <p:nvPr>
+            <p:ph type="sldNum" sz="quarter" idx="10"/>
+          </p:nvPr>
+        </p:nvSpPr>
+        <p:spPr/>
+        <p:txBody>
+          <a:bodyPr/>
+          <a:lstStyle/>
+          <a:p>
+            <a:fld id="{F7021451-1387-4CA6-816F-3879F97B5CBC}" type="slidenum">
+              <a:rPr lang="en-US"/>
+              <a:t>7</a:t>
+            </a:fld>
+            <a:endParaRPr lang="en-US"/>
+          </a:p>
+        </p:txBody>
+      </p:sp>
+    </p:spTree>
+    <p:extLst>
+      <p:ext uri="{BB962C8B-B14F-4D97-AF65-F5344CB8AC3E}">
+        <p14:creationId xmlns:p14="http://schemas.microsoft.com/office/powerpoint/2010/main" val="1024086991"/>
+      </p:ext>
+    </p:extLst>
+  </p:cSld>
+  <p:clrMapOvr>
+    <a:masterClrMapping/>
+  </p:clrMapOvr>
+</p:notes>
+</file>
+
+<file path=ppt/notesSlides/notesSlide8.xml><?xml version="1.0" encoding="utf-8"?>
+<p:notes xmlns:a="http://schemas.openxmlformats.org/drawingml/2006/main" xmlns:r="http://schemas.openxmlformats.org/officeDocument/2006/relationships" xmlns:p="http://schemas.openxmlformats.org/presentationml/2006/main">
+  <p:cSld>
+    <p:spTree>
+      <p:nvGrpSpPr>
+        <p:cNvPr id="1" name=""/>
+        <p:cNvGrpSpPr/>
+        <p:nvPr/>
+      </p:nvGrpSpPr>
+      <p:grpSpPr>
+        <a:xfrm>
+          <a:off x="0" y="0"/>
+          <a:ext cx="0" cy="0"/>
+          <a:chOff x="0" y="0"/>
+          <a:chExt cx="0" cy="0"/>
+        </a:xfrm>
+      </p:grpSpPr>
+      <p:sp>
+        <p:nvSpPr>
+          <p:cNvPr id="2" name="Slide Image Placeholder 1"/>
+          <p:cNvSpPr>
+            <a:spLocks noGrp="1" noRot="1" noChangeAspect="1"/>
+          </p:cNvSpPr>
+          <p:nvPr>
+            <p:ph type="sldImg"/>
+          </p:nvPr>
+        </p:nvSpPr>
+        <p:spPr/>
+      </p:sp>
+      <p:sp>
+        <p:nvSpPr>
+          <p:cNvPr id="3" name="Notes Placeholder 2"/>
+          <p:cNvSpPr>
+            <a:spLocks noGrp="1"/>
+          </p:cNvSpPr>
+          <p:nvPr>
+            <p:ph type="body" idx="1"/>
+          </p:nvPr>
+        </p:nvSpPr>
+        <p:spPr/>
+        <p:txBody>
+          <a:bodyPr/>
+          <a:lstStyle/>
+          <a:p>
+            <a:r>
+              <a:rPr lang="en-US" dirty="0"/>
+              <a:t/>
+            </a:r>
+            <a:endParaRPr lang="en-US" dirty="0"/>
+          </a:p>
+        </p:txBody>
+      </p:sp>
+      <p:sp>
+        <p:nvSpPr>
+          <p:cNvPr id="4" name="Slide Number Placeholder 3"/>
+          <p:cNvSpPr>
+            <a:spLocks noGrp="1"/>
+          </p:cNvSpPr>
+          <p:nvPr>
+            <p:ph type="sldNum" sz="quarter" idx="10"/>
+          </p:nvPr>
+        </p:nvSpPr>
+        <p:spPr/>
+        <p:txBody>
+          <a:bodyPr/>
+          <a:lstStyle/>
+          <a:p>
+            <a:fld id="{F7021451-1387-4CA6-816F-3879F97B5CBC}" type="slidenum">
+              <a:rPr lang="en-US"/>
+              <a:t>8</a:t>
+            </a:fld>
+            <a:endParaRPr lang="en-US"/>
+          </a:p>
+        </p:txBody>
+      </p:sp>
+    </p:spTree>
+    <p:extLst>
+      <p:ext uri="{BB962C8B-B14F-4D97-AF65-F5344CB8AC3E}">
+        <p14:creationId xmlns:p14="http://schemas.microsoft.com/office/powerpoint/2010/main" val="1024086991"/>
+      </p:ext>
+    </p:extLst>
+  </p:cSld>
+  <p:clrMapOvr>
+    <a:masterClrMapping/>
+  </p:clrMapOvr>
+</p:notes>
+</file>
+
 <file path=ppt/slideLayouts/slideLayout1.xml><?xml version="1.0" encoding="utf-8"?>
 <p:sldLayout xmlns:a="http://schemas.openxmlformats.org/drawingml/2006/main" xmlns:r="http://schemas.openxmlformats.org/officeDocument/2006/relationships" xmlns:p="http://schemas.openxmlformats.org/presentationml/2006/main" preserve="1">
   <p:cSld name="DEFAULT">
@@ -956,7 +1579,7 @@
       </p:sp>
       <p:pic>
         <p:nvPicPr>
-          <p:cNvPr id="4" name="Object 3" descr="https://ibb.co/qdfrcct">    </p:cNvPr>
+          <p:cNvPr id="4" name="Object 3" descr="https://i.ibb.co/VDZGTwB/backgroundimg.jpg">    </p:cNvPr>
           <p:cNvPicPr>
             <a:picLocks noChangeAspect="1"/>
           </p:cNvPicPr>
@@ -970,6 +1593,30 @@
         </p:blipFill>
         <p:spPr>
           <a:xfrm>
+            <a:off x="0" y="0"/>
+            <a:ext cx="3840480" cy="5143500"/>
+          </a:xfrm>
+          <a:prstGeom prst="rect">
+            <a:avLst/>
+          </a:prstGeom>
+        </p:spPr>
+      </p:pic>
+      <p:pic>
+        <p:nvPicPr>
+          <p:cNvPr id="5" name="Object 4" descr="https://i.ibb.co/VtZqzz7/stilingue.png">    </p:cNvPr>
+          <p:cNvPicPr>
+            <a:picLocks noChangeAspect="1"/>
+          </p:cNvPicPr>
+          <p:nvPr/>
+        </p:nvPicPr>
+        <p:blipFill>
+          <a:blip r:embed="rId2"/>
+          <a:stretch>
+            <a:fillRect/>
+          </a:stretch>
+        </p:blipFill>
+        <p:spPr>
+          <a:xfrm>
             <a:off x="3017520" y="1851660"/>
             <a:ext cx="1645920" cy="1691640"/>
           </a:xfrm>
@@ -978,6 +1625,3673 @@
           </a:prstGeom>
         </p:spPr>
       </p:pic>
+    </p:spTree>
+  </p:cSld>
+  <p:clrMapOvr>
+    <a:masterClrMapping/>
+  </p:clrMapOvr>
+</p:sld>
+</file>
+
+<file path=ppt/slides/slide2.xml><?xml version="1.0" encoding="utf-8"?>
+<p:sld xmlns:a="http://schemas.openxmlformats.org/drawingml/2006/main" xmlns:r="http://schemas.openxmlformats.org/officeDocument/2006/relationships" xmlns:p="http://schemas.openxmlformats.org/presentationml/2006/main">
+  <p:cSld name="Slide 2">
+    <p:bg>
+      <p:bgPr>
+        <a:blipFill dpi="0" rotWithShape="1">
+          <a:blip r:embed="rId1">
+            <a:lum/>
+          </a:blip>
+          <a:srcRect/>
+          <a:stretch>
+            <a:fillRect/>
+          </a:stretch>
+        </a:blipFill>
+        <a:effectLst/>
+      </p:bgPr>
+    </p:bg>
+    <p:spTree>
+      <p:nvGrpSpPr>
+        <p:cNvPr id="1" name=""/>
+        <p:cNvGrpSpPr/>
+        <p:nvPr/>
+      </p:nvGrpSpPr>
+      <p:grpSpPr>
+        <a:xfrm>
+          <a:off x="0" y="0"/>
+          <a:ext cx="0" cy="0"/>
+          <a:chOff x="0" y="0"/>
+          <a:chExt cx="0" cy="0"/>
+        </a:xfrm>
+      </p:grpSpPr>
+      <p:sp>
+        <p:nvSpPr>
+          <p:cNvPr id="2" name="Object1"/>
+          <p:cNvSpPr/>
+          <p:nvPr/>
+        </p:nvSpPr>
+        <p:spPr>
+          <a:xfrm>
+            <a:off x="457200" y="1737360"/>
+            <a:ext cx="6858000" cy="0"/>
+          </a:xfrm>
+          <a:prstGeom prst="rect">
+            <a:avLst/>
+          </a:prstGeom>
+          <a:solidFill>
+            <a:srgbClr val="F1F1F1"/>
+          </a:solidFill>
+          <a:ln/>
+        </p:spPr>
+        <p:txBody>
+          <a:bodyPr wrap="square" rtlCol="0" anchor="ctr"/>
+          <a:lstStyle/>
+          <a:p>
+            <a:pPr algn="l"/>
+            <a:r>
+              <a:rPr lang="en-US" sz="6800" b="1" dirty="0">
+                <a:solidFill>
+                  <a:srgbClr val="3E909A"/>
+                </a:solidFill>
+                <a:latin typeface="Open Sans" pitchFamily="34" charset="0"/>
+                <a:ea typeface="Open Sans" pitchFamily="34" charset="-122"/>
+                <a:cs typeface="Open Sans" pitchFamily="34" charset="-120"/>
+              </a:rPr>
+              <a:t>Agenda</a:t>
+            </a:r>
+            <a:endParaRPr lang="en-US" sz="6800" dirty="0"/>
+          </a:p>
+        </p:txBody>
+      </p:sp>
+      <p:sp>
+        <p:nvSpPr>
+          <p:cNvPr id="3" name="Object2"/>
+          <p:cNvSpPr/>
+          <p:nvPr/>
+        </p:nvSpPr>
+        <p:spPr>
+          <a:xfrm>
+            <a:off x="2560320" y="1993392"/>
+            <a:ext cx="6858000" cy="0"/>
+          </a:xfrm>
+          <a:prstGeom prst="rect">
+            <a:avLst/>
+          </a:prstGeom>
+          <a:solidFill>
+            <a:srgbClr val="F1F1F1"/>
+          </a:solidFill>
+          <a:ln/>
+        </p:spPr>
+        <p:txBody>
+          <a:bodyPr wrap="square" rtlCol="0" anchor="ctr"/>
+          <a:lstStyle/>
+          <a:p>
+            <a:pPr algn="l"/>
+            <a:r>
+              <a:rPr lang="en-US" sz="2500" b="1" dirty="0">
+                <a:solidFill>
+                  <a:srgbClr val="FFFFFF"/>
+                </a:solidFill>
+                <a:latin typeface="Open Sans" pitchFamily="34" charset="0"/>
+                <a:ea typeface="Open Sans" pitchFamily="34" charset="-122"/>
+                <a:cs typeface="Open Sans" pitchFamily="34" charset="-120"/>
+              </a:rPr>
+              <a:t>Agenda</a:t>
+            </a:r>
+            <a:endParaRPr lang="en-US" sz="2500" dirty="0"/>
+          </a:p>
+        </p:txBody>
+      </p:sp>
+      <p:sp>
+        <p:nvSpPr>
+          <p:cNvPr id="4" name="Object3"/>
+          <p:cNvSpPr/>
+          <p:nvPr/>
+        </p:nvSpPr>
+        <p:spPr>
+          <a:xfrm>
+            <a:off x="4389120" y="2011680"/>
+            <a:ext cx="6858000" cy="0"/>
+          </a:xfrm>
+          <a:prstGeom prst="rect">
+            <a:avLst/>
+          </a:prstGeom>
+          <a:noFill/>
+          <a:ln/>
+        </p:spPr>
+        <p:txBody>
+          <a:bodyPr wrap="square" rtlCol="0" anchor="ctr"/>
+          <a:lstStyle/>
+          <a:p>
+            <a:pPr algn="l"/>
+            <a:r>
+              <a:rPr lang="en-US" sz="1300" dirty="0">
+                <a:solidFill>
+                  <a:srgbClr val="FFFFFF"/>
+                </a:solidFill>
+                <a:latin typeface="Open Sans" pitchFamily="34" charset="0"/>
+                <a:ea typeface="Open Sans" pitchFamily="34" charset="-122"/>
+                <a:cs typeface="Open Sans" pitchFamily="34" charset="-120"/>
+              </a:rPr>
+              <a:t>METODOLOGIA</a:t>
+            </a:r>
+            <a:endParaRPr lang="en-US" sz="1300" dirty="0"/>
+          </a:p>
+        </p:txBody>
+      </p:sp>
+      <p:sp>
+        <p:nvSpPr>
+          <p:cNvPr id="5" name="Object4"/>
+          <p:cNvSpPr/>
+          <p:nvPr/>
+        </p:nvSpPr>
+        <p:spPr>
+          <a:xfrm>
+            <a:off x="4389120" y="2377440"/>
+            <a:ext cx="6858000" cy="0"/>
+          </a:xfrm>
+          <a:prstGeom prst="rect">
+            <a:avLst/>
+          </a:prstGeom>
+          <a:noFill/>
+          <a:ln/>
+        </p:spPr>
+        <p:txBody>
+          <a:bodyPr wrap="square" rtlCol="0" anchor="ctr"/>
+          <a:lstStyle/>
+          <a:p>
+            <a:pPr algn="l"/>
+            <a:r>
+              <a:rPr lang="en-US" sz="1300" dirty="0">
+                <a:solidFill>
+                  <a:srgbClr val="FFFFFF"/>
+                </a:solidFill>
+                <a:latin typeface="Open Sans" pitchFamily="34" charset="0"/>
+                <a:ea typeface="Open Sans" pitchFamily="34" charset="-122"/>
+                <a:cs typeface="Open Sans" pitchFamily="34" charset="-120"/>
+              </a:rPr>
+              <a:t>DESTAQUES</a:t>
+            </a:r>
+            <a:endParaRPr lang="en-US" sz="1300" dirty="0"/>
+          </a:p>
+        </p:txBody>
+      </p:sp>
+      <p:sp>
+        <p:nvSpPr>
+          <p:cNvPr id="6" name="Object5"/>
+          <p:cNvSpPr/>
+          <p:nvPr/>
+        </p:nvSpPr>
+        <p:spPr>
+          <a:xfrm>
+            <a:off x="4389120" y="2743200"/>
+            <a:ext cx="6858000" cy="0"/>
+          </a:xfrm>
+          <a:prstGeom prst="rect">
+            <a:avLst/>
+          </a:prstGeom>
+          <a:noFill/>
+          <a:ln/>
+        </p:spPr>
+        <p:txBody>
+          <a:bodyPr wrap="square" rtlCol="0" anchor="ctr"/>
+          <a:lstStyle/>
+          <a:p>
+            <a:pPr algn="l"/>
+            <a:r>
+              <a:rPr lang="en-US" sz="1300" dirty="0">
+                <a:solidFill>
+                  <a:srgbClr val="FFFFFF"/>
+                </a:solidFill>
+                <a:latin typeface="Open Sans" pitchFamily="34" charset="0"/>
+                <a:ea typeface="Open Sans" pitchFamily="34" charset="-122"/>
+                <a:cs typeface="Open Sans" pitchFamily="34" charset="-120"/>
+              </a:rPr>
+              <a:t>OVERVIEW</a:t>
+            </a:r>
+            <a:endParaRPr lang="en-US" sz="1300" dirty="0"/>
+          </a:p>
+        </p:txBody>
+      </p:sp>
+      <p:sp>
+        <p:nvSpPr>
+          <p:cNvPr id="7" name="Object6"/>
+          <p:cNvSpPr/>
+          <p:nvPr/>
+        </p:nvSpPr>
+        <p:spPr>
+          <a:xfrm>
+            <a:off x="4389120" y="3108960"/>
+            <a:ext cx="6858000" cy="0"/>
+          </a:xfrm>
+          <a:prstGeom prst="rect">
+            <a:avLst/>
+          </a:prstGeom>
+          <a:noFill/>
+          <a:ln/>
+        </p:spPr>
+        <p:txBody>
+          <a:bodyPr wrap="square" rtlCol="0" anchor="ctr"/>
+          <a:lstStyle/>
+          <a:p>
+            <a:pPr algn="l"/>
+            <a:r>
+              <a:rPr lang="en-US" sz="1300" dirty="0">
+                <a:solidFill>
+                  <a:srgbClr val="FFFFFF"/>
+                </a:solidFill>
+                <a:latin typeface="Open Sans" pitchFamily="34" charset="0"/>
+                <a:ea typeface="Open Sans" pitchFamily="34" charset="-122"/>
+                <a:cs typeface="Open Sans" pitchFamily="34" charset="-120"/>
+              </a:rPr>
+              <a:t>MINHA CATEGORIA</a:t>
+            </a:r>
+            <a:endParaRPr lang="en-US" sz="1300" dirty="0"/>
+          </a:p>
+        </p:txBody>
+      </p:sp>
+      <p:sp>
+        <p:nvSpPr>
+          <p:cNvPr id="8" name="Object7"/>
+          <p:cNvSpPr/>
+          <p:nvPr/>
+        </p:nvSpPr>
+        <p:spPr>
+          <a:xfrm>
+            <a:off x="4389120" y="3474720"/>
+            <a:ext cx="6858000" cy="0"/>
+          </a:xfrm>
+          <a:prstGeom prst="rect">
+            <a:avLst/>
+          </a:prstGeom>
+          <a:noFill/>
+          <a:ln/>
+        </p:spPr>
+        <p:txBody>
+          <a:bodyPr wrap="square" rtlCol="0" anchor="ctr"/>
+          <a:lstStyle/>
+          <a:p>
+            <a:pPr algn="l"/>
+            <a:r>
+              <a:rPr lang="en-US" sz="1300" dirty="0">
+                <a:solidFill>
+                  <a:srgbClr val="FFFFFF"/>
+                </a:solidFill>
+                <a:latin typeface="Open Sans" pitchFamily="34" charset="0"/>
+                <a:ea typeface="Open Sans" pitchFamily="34" charset="-122"/>
+                <a:cs typeface="Open Sans" pitchFamily="34" charset="-120"/>
+              </a:rPr>
+              <a:t>MINHA MARCA</a:t>
+            </a:r>
+            <a:endParaRPr lang="en-US" sz="1300" dirty="0"/>
+          </a:p>
+        </p:txBody>
+      </p:sp>
+      <p:sp>
+        <p:nvSpPr>
+          <p:cNvPr id="9" name="Object8"/>
+          <p:cNvSpPr/>
+          <p:nvPr/>
+        </p:nvSpPr>
+        <p:spPr>
+          <a:xfrm>
+            <a:off x="4389120" y="3840480"/>
+            <a:ext cx="6858000" cy="0"/>
+          </a:xfrm>
+          <a:prstGeom prst="rect">
+            <a:avLst/>
+          </a:prstGeom>
+          <a:noFill/>
+          <a:ln/>
+        </p:spPr>
+        <p:txBody>
+          <a:bodyPr wrap="square" rtlCol="0" anchor="ctr"/>
+          <a:lstStyle/>
+          <a:p>
+            <a:pPr algn="l"/>
+            <a:r>
+              <a:rPr lang="en-US" sz="1300" dirty="0">
+                <a:solidFill>
+                  <a:srgbClr val="FFFFFF"/>
+                </a:solidFill>
+                <a:latin typeface="Open Sans" pitchFamily="34" charset="0"/>
+                <a:ea typeface="Open Sans" pitchFamily="34" charset="-122"/>
+                <a:cs typeface="Open Sans" pitchFamily="34" charset="-120"/>
+              </a:rPr>
+              <a:t>MEUS COMPARÁVEIS</a:t>
+            </a:r>
+            <a:endParaRPr lang="en-US" sz="1300" dirty="0"/>
+          </a:p>
+        </p:txBody>
+      </p:sp>
+      <p:sp>
+        <p:nvSpPr>
+          <p:cNvPr id="10" name="Object9"/>
+          <p:cNvSpPr/>
+          <p:nvPr/>
+        </p:nvSpPr>
+        <p:spPr>
+          <a:xfrm>
+            <a:off x="4389120" y="4206240"/>
+            <a:ext cx="6858000" cy="0"/>
+          </a:xfrm>
+          <a:prstGeom prst="rect">
+            <a:avLst/>
+          </a:prstGeom>
+          <a:noFill/>
+          <a:ln/>
+        </p:spPr>
+        <p:txBody>
+          <a:bodyPr wrap="square" rtlCol="0" anchor="ctr"/>
+          <a:lstStyle/>
+          <a:p>
+            <a:pPr algn="l"/>
+            <a:r>
+              <a:rPr lang="en-US" sz="1300" dirty="0">
+                <a:solidFill>
+                  <a:srgbClr val="FFFFFF"/>
+                </a:solidFill>
+                <a:latin typeface="Open Sans" pitchFamily="34" charset="0"/>
+                <a:ea typeface="Open Sans" pitchFamily="34" charset="-122"/>
+                <a:cs typeface="Open Sans" pitchFamily="34" charset="-120"/>
+              </a:rPr>
+              <a:t>PRÓXIMOS PASSOS</a:t>
+            </a:r>
+            <a:endParaRPr lang="en-US" sz="1300" dirty="0"/>
+          </a:p>
+        </p:txBody>
+      </p:sp>
+    </p:spTree>
+  </p:cSld>
+  <p:clrMapOvr>
+    <a:masterClrMapping/>
+  </p:clrMapOvr>
+</p:sld>
+</file>
+
+<file path=ppt/slides/slide3.xml><?xml version="1.0" encoding="utf-8"?>
+<p:sld xmlns:a="http://schemas.openxmlformats.org/drawingml/2006/main" xmlns:r="http://schemas.openxmlformats.org/officeDocument/2006/relationships" xmlns:p="http://schemas.openxmlformats.org/presentationml/2006/main">
+  <p:cSld name="Slide 3">
+    <p:bg>
+      <p:bgPr>
+        <a:blipFill dpi="0" rotWithShape="1">
+          <a:blip r:embed="rId1">
+            <a:lum/>
+          </a:blip>
+          <a:srcRect/>
+          <a:stretch>
+            <a:fillRect/>
+          </a:stretch>
+        </a:blipFill>
+        <a:effectLst/>
+      </p:bgPr>
+    </p:bg>
+    <p:spTree>
+      <p:nvGrpSpPr>
+        <p:cNvPr id="1" name=""/>
+        <p:cNvGrpSpPr/>
+        <p:nvPr/>
+      </p:nvGrpSpPr>
+      <p:grpSpPr>
+        <a:xfrm>
+          <a:off x="0" y="0"/>
+          <a:ext cx="0" cy="0"/>
+          <a:chOff x="0" y="0"/>
+          <a:chExt cx="0" cy="0"/>
+        </a:xfrm>
+      </p:grpSpPr>
+      <p:sp>
+        <p:nvSpPr>
+          <p:cNvPr id="2" name="Object1"/>
+          <p:cNvSpPr/>
+          <p:nvPr/>
+        </p:nvSpPr>
+        <p:spPr>
+          <a:xfrm>
+            <a:off x="457200" y="1737360"/>
+            <a:ext cx="6858000" cy="0"/>
+          </a:xfrm>
+          <a:prstGeom prst="rect">
+            <a:avLst/>
+          </a:prstGeom>
+          <a:solidFill>
+            <a:srgbClr val="F1F1F1"/>
+          </a:solidFill>
+          <a:ln/>
+        </p:spPr>
+        <p:txBody>
+          <a:bodyPr wrap="square" rtlCol="0" anchor="ctr"/>
+          <a:lstStyle/>
+          <a:p>
+            <a:pPr algn="l"/>
+            <a:r>
+              <a:rPr lang="en-US" sz="6800" b="1" dirty="0">
+                <a:solidFill>
+                  <a:srgbClr val="3E909A"/>
+                </a:solidFill>
+                <a:latin typeface="Open Sans" pitchFamily="34" charset="0"/>
+                <a:ea typeface="Open Sans" pitchFamily="34" charset="-122"/>
+                <a:cs typeface="Open Sans" pitchFamily="34" charset="-120"/>
+              </a:rPr>
+              <a:t>Agenda</a:t>
+            </a:r>
+            <a:endParaRPr lang="en-US" sz="6800" dirty="0"/>
+          </a:p>
+        </p:txBody>
+      </p:sp>
+      <p:sp>
+        <p:nvSpPr>
+          <p:cNvPr id="3" name="Object2"/>
+          <p:cNvSpPr/>
+          <p:nvPr/>
+        </p:nvSpPr>
+        <p:spPr>
+          <a:xfrm>
+            <a:off x="2560320" y="1993392"/>
+            <a:ext cx="6858000" cy="0"/>
+          </a:xfrm>
+          <a:prstGeom prst="rect">
+            <a:avLst/>
+          </a:prstGeom>
+          <a:solidFill>
+            <a:srgbClr val="F1F1F1"/>
+          </a:solidFill>
+          <a:ln/>
+        </p:spPr>
+        <p:txBody>
+          <a:bodyPr wrap="square" rtlCol="0" anchor="ctr"/>
+          <a:lstStyle/>
+          <a:p>
+            <a:pPr algn="l"/>
+            <a:r>
+              <a:rPr lang="en-US" sz="2500" b="1" dirty="0">
+                <a:solidFill>
+                  <a:srgbClr val="FFFFFF"/>
+                </a:solidFill>
+                <a:latin typeface="Open Sans" pitchFamily="34" charset="0"/>
+                <a:ea typeface="Open Sans" pitchFamily="34" charset="-122"/>
+                <a:cs typeface="Open Sans" pitchFamily="34" charset="-120"/>
+              </a:rPr>
+              <a:t>Agenda</a:t>
+            </a:r>
+            <a:endParaRPr lang="en-US" sz="2500" dirty="0"/>
+          </a:p>
+        </p:txBody>
+      </p:sp>
+      <p:sp>
+        <p:nvSpPr>
+          <p:cNvPr id="4" name="Object3"/>
+          <p:cNvSpPr/>
+          <p:nvPr/>
+        </p:nvSpPr>
+        <p:spPr>
+          <a:xfrm>
+            <a:off x="4389120" y="2011680"/>
+            <a:ext cx="6858000" cy="0"/>
+          </a:xfrm>
+          <a:prstGeom prst="rect">
+            <a:avLst/>
+          </a:prstGeom>
+          <a:noFill/>
+          <a:ln/>
+        </p:spPr>
+        <p:txBody>
+          <a:bodyPr wrap="square" rtlCol="0" anchor="ctr"/>
+          <a:lstStyle/>
+          <a:p>
+            <a:pPr algn="l"/>
+            <a:r>
+              <a:rPr lang="en-US" sz="1300" b="1" dirty="0">
+                <a:solidFill>
+                  <a:srgbClr val="FFFF00"/>
+                </a:solidFill>
+                <a:latin typeface="Open Sans" pitchFamily="34" charset="0"/>
+                <a:ea typeface="Open Sans" pitchFamily="34" charset="-122"/>
+                <a:cs typeface="Open Sans" pitchFamily="34" charset="-120"/>
+              </a:rPr>
+              <a:t>METODOLOGIA</a:t>
+            </a:r>
+            <a:endParaRPr lang="en-US" sz="1300" dirty="0"/>
+          </a:p>
+        </p:txBody>
+      </p:sp>
+      <p:sp>
+        <p:nvSpPr>
+          <p:cNvPr id="5" name="Object4"/>
+          <p:cNvSpPr/>
+          <p:nvPr/>
+        </p:nvSpPr>
+        <p:spPr>
+          <a:xfrm>
+            <a:off x="4389120" y="2377440"/>
+            <a:ext cx="6858000" cy="0"/>
+          </a:xfrm>
+          <a:prstGeom prst="rect">
+            <a:avLst/>
+          </a:prstGeom>
+          <a:noFill/>
+          <a:ln/>
+        </p:spPr>
+        <p:txBody>
+          <a:bodyPr wrap="square" rtlCol="0" anchor="ctr"/>
+          <a:lstStyle/>
+          <a:p>
+            <a:pPr algn="l"/>
+            <a:r>
+              <a:rPr lang="en-US" sz="1300" dirty="0">
+                <a:solidFill>
+                  <a:srgbClr val="FFFFFF"/>
+                </a:solidFill>
+                <a:latin typeface="Open Sans" pitchFamily="34" charset="0"/>
+                <a:ea typeface="Open Sans" pitchFamily="34" charset="-122"/>
+                <a:cs typeface="Open Sans" pitchFamily="34" charset="-120"/>
+              </a:rPr>
+              <a:t>DESTAQUES</a:t>
+            </a:r>
+            <a:endParaRPr lang="en-US" sz="1300" dirty="0"/>
+          </a:p>
+        </p:txBody>
+      </p:sp>
+      <p:sp>
+        <p:nvSpPr>
+          <p:cNvPr id="6" name="Object5"/>
+          <p:cNvSpPr/>
+          <p:nvPr/>
+        </p:nvSpPr>
+        <p:spPr>
+          <a:xfrm>
+            <a:off x="4389120" y="2743200"/>
+            <a:ext cx="6858000" cy="0"/>
+          </a:xfrm>
+          <a:prstGeom prst="rect">
+            <a:avLst/>
+          </a:prstGeom>
+          <a:noFill/>
+          <a:ln/>
+        </p:spPr>
+        <p:txBody>
+          <a:bodyPr wrap="square" rtlCol="0" anchor="ctr"/>
+          <a:lstStyle/>
+          <a:p>
+            <a:pPr algn="l"/>
+            <a:r>
+              <a:rPr lang="en-US" sz="1300" dirty="0">
+                <a:solidFill>
+                  <a:srgbClr val="FFFFFF"/>
+                </a:solidFill>
+                <a:latin typeface="Open Sans" pitchFamily="34" charset="0"/>
+                <a:ea typeface="Open Sans" pitchFamily="34" charset="-122"/>
+                <a:cs typeface="Open Sans" pitchFamily="34" charset="-120"/>
+              </a:rPr>
+              <a:t>OVERVIEW</a:t>
+            </a:r>
+            <a:endParaRPr lang="en-US" sz="1300" dirty="0"/>
+          </a:p>
+        </p:txBody>
+      </p:sp>
+      <p:sp>
+        <p:nvSpPr>
+          <p:cNvPr id="7" name="Object6"/>
+          <p:cNvSpPr/>
+          <p:nvPr/>
+        </p:nvSpPr>
+        <p:spPr>
+          <a:xfrm>
+            <a:off x="4389120" y="3108960"/>
+            <a:ext cx="6858000" cy="0"/>
+          </a:xfrm>
+          <a:prstGeom prst="rect">
+            <a:avLst/>
+          </a:prstGeom>
+          <a:noFill/>
+          <a:ln/>
+        </p:spPr>
+        <p:txBody>
+          <a:bodyPr wrap="square" rtlCol="0" anchor="ctr"/>
+          <a:lstStyle/>
+          <a:p>
+            <a:pPr algn="l"/>
+            <a:r>
+              <a:rPr lang="en-US" sz="1300" dirty="0">
+                <a:solidFill>
+                  <a:srgbClr val="FFFFFF"/>
+                </a:solidFill>
+                <a:latin typeface="Open Sans" pitchFamily="34" charset="0"/>
+                <a:ea typeface="Open Sans" pitchFamily="34" charset="-122"/>
+                <a:cs typeface="Open Sans" pitchFamily="34" charset="-120"/>
+              </a:rPr>
+              <a:t>MINHA CATEGORIA</a:t>
+            </a:r>
+            <a:endParaRPr lang="en-US" sz="1300" dirty="0"/>
+          </a:p>
+        </p:txBody>
+      </p:sp>
+      <p:sp>
+        <p:nvSpPr>
+          <p:cNvPr id="8" name="Object7"/>
+          <p:cNvSpPr/>
+          <p:nvPr/>
+        </p:nvSpPr>
+        <p:spPr>
+          <a:xfrm>
+            <a:off x="4389120" y="3474720"/>
+            <a:ext cx="6858000" cy="0"/>
+          </a:xfrm>
+          <a:prstGeom prst="rect">
+            <a:avLst/>
+          </a:prstGeom>
+          <a:noFill/>
+          <a:ln/>
+        </p:spPr>
+        <p:txBody>
+          <a:bodyPr wrap="square" rtlCol="0" anchor="ctr"/>
+          <a:lstStyle/>
+          <a:p>
+            <a:pPr algn="l"/>
+            <a:r>
+              <a:rPr lang="en-US" sz="1300" dirty="0">
+                <a:solidFill>
+                  <a:srgbClr val="FFFFFF"/>
+                </a:solidFill>
+                <a:latin typeface="Open Sans" pitchFamily="34" charset="0"/>
+                <a:ea typeface="Open Sans" pitchFamily="34" charset="-122"/>
+                <a:cs typeface="Open Sans" pitchFamily="34" charset="-120"/>
+              </a:rPr>
+              <a:t>MINHA MARCA</a:t>
+            </a:r>
+            <a:endParaRPr lang="en-US" sz="1300" dirty="0"/>
+          </a:p>
+        </p:txBody>
+      </p:sp>
+      <p:sp>
+        <p:nvSpPr>
+          <p:cNvPr id="9" name="Object8"/>
+          <p:cNvSpPr/>
+          <p:nvPr/>
+        </p:nvSpPr>
+        <p:spPr>
+          <a:xfrm>
+            <a:off x="4389120" y="3840480"/>
+            <a:ext cx="6858000" cy="0"/>
+          </a:xfrm>
+          <a:prstGeom prst="rect">
+            <a:avLst/>
+          </a:prstGeom>
+          <a:noFill/>
+          <a:ln/>
+        </p:spPr>
+        <p:txBody>
+          <a:bodyPr wrap="square" rtlCol="0" anchor="ctr"/>
+          <a:lstStyle/>
+          <a:p>
+            <a:pPr algn="l"/>
+            <a:r>
+              <a:rPr lang="en-US" sz="1300" dirty="0">
+                <a:solidFill>
+                  <a:srgbClr val="FFFFFF"/>
+                </a:solidFill>
+                <a:latin typeface="Open Sans" pitchFamily="34" charset="0"/>
+                <a:ea typeface="Open Sans" pitchFamily="34" charset="-122"/>
+                <a:cs typeface="Open Sans" pitchFamily="34" charset="-120"/>
+              </a:rPr>
+              <a:t>MEUS COMPARÁVEIS</a:t>
+            </a:r>
+            <a:endParaRPr lang="en-US" sz="1300" dirty="0"/>
+          </a:p>
+        </p:txBody>
+      </p:sp>
+      <p:sp>
+        <p:nvSpPr>
+          <p:cNvPr id="10" name="Object9"/>
+          <p:cNvSpPr/>
+          <p:nvPr/>
+        </p:nvSpPr>
+        <p:spPr>
+          <a:xfrm>
+            <a:off x="4389120" y="4206240"/>
+            <a:ext cx="6858000" cy="0"/>
+          </a:xfrm>
+          <a:prstGeom prst="rect">
+            <a:avLst/>
+          </a:prstGeom>
+          <a:noFill/>
+          <a:ln/>
+        </p:spPr>
+        <p:txBody>
+          <a:bodyPr wrap="square" rtlCol="0" anchor="ctr"/>
+          <a:lstStyle/>
+          <a:p>
+            <a:pPr algn="l"/>
+            <a:r>
+              <a:rPr lang="en-US" sz="1300" dirty="0">
+                <a:solidFill>
+                  <a:srgbClr val="FFFFFF"/>
+                </a:solidFill>
+                <a:latin typeface="Open Sans" pitchFamily="34" charset="0"/>
+                <a:ea typeface="Open Sans" pitchFamily="34" charset="-122"/>
+                <a:cs typeface="Open Sans" pitchFamily="34" charset="-120"/>
+              </a:rPr>
+              <a:t>PRÓXIMOS PASSOS</a:t>
+            </a:r>
+            <a:endParaRPr lang="en-US" sz="1300" dirty="0"/>
+          </a:p>
+        </p:txBody>
+      </p:sp>
+    </p:spTree>
+  </p:cSld>
+  <p:clrMapOvr>
+    <a:masterClrMapping/>
+  </p:clrMapOvr>
+</p:sld>
+</file>
+
+<file path=ppt/slides/slide4.xml><?xml version="1.0" encoding="utf-8"?>
+<p:sld xmlns:a="http://schemas.openxmlformats.org/drawingml/2006/main" xmlns:r="http://schemas.openxmlformats.org/officeDocument/2006/relationships" xmlns:p="http://schemas.openxmlformats.org/presentationml/2006/main">
+  <p:cSld name="Slide 4">
+    <p:spTree>
+      <p:nvGrpSpPr>
+        <p:cNvPr id="1" name=""/>
+        <p:cNvGrpSpPr/>
+        <p:nvPr/>
+      </p:nvGrpSpPr>
+      <p:grpSpPr>
+        <a:xfrm>
+          <a:off x="0" y="0"/>
+          <a:ext cx="0" cy="0"/>
+          <a:chOff x="0" y="0"/>
+          <a:chExt cx="0" cy="0"/>
+        </a:xfrm>
+      </p:grpSpPr>
+      <p:sp>
+        <p:nvSpPr>
+          <p:cNvPr id="2" name="Object1"/>
+          <p:cNvSpPr/>
+          <p:nvPr/>
+        </p:nvSpPr>
+        <p:spPr>
+          <a:xfrm>
+            <a:off x="0" y="4629150"/>
+            <a:ext cx="9144000" cy="514350"/>
+          </a:xfrm>
+          <a:prstGeom prst="rect">
+            <a:avLst/>
+          </a:prstGeom>
+          <a:solidFill>
+            <a:srgbClr val="58CCBE"/>
+          </a:solidFill>
+          <a:ln/>
+        </p:spPr>
+      </p:sp>
+      <p:pic>
+        <p:nvPicPr>
+          <p:cNvPr id="3" name="Object 2" descr="https://i.ibb.co/W51R8Cm/logo.png">    </p:cNvPr>
+          <p:cNvPicPr>
+            <a:picLocks noChangeAspect="1"/>
+          </p:cNvPicPr>
+          <p:nvPr/>
+        </p:nvPicPr>
+        <p:blipFill>
+          <a:blip r:embed="rId1"/>
+          <a:stretch>
+            <a:fillRect/>
+          </a:stretch>
+        </p:blipFill>
+        <p:spPr>
+          <a:xfrm>
+            <a:off x="4114800" y="4783455"/>
+            <a:ext cx="1097280" cy="257175"/>
+          </a:xfrm>
+          <a:prstGeom prst="rect">
+            <a:avLst/>
+          </a:prstGeom>
+        </p:spPr>
+      </p:pic>
+      <p:sp>
+        <p:nvSpPr>
+          <p:cNvPr id="4" name="Object3"/>
+          <p:cNvSpPr/>
+          <p:nvPr/>
+        </p:nvSpPr>
+        <p:spPr>
+          <a:xfrm>
+            <a:off x="0" y="0"/>
+            <a:ext cx="9144000" cy="308610"/>
+          </a:xfrm>
+          <a:prstGeom prst="rect">
+            <a:avLst/>
+          </a:prstGeom>
+          <a:solidFill>
+            <a:srgbClr val="F2F2F2"/>
+          </a:solidFill>
+          <a:ln/>
+        </p:spPr>
+      </p:sp>
+      <p:sp>
+        <p:nvSpPr>
+          <p:cNvPr id="5" name="Object4"/>
+          <p:cNvSpPr/>
+          <p:nvPr/>
+        </p:nvSpPr>
+        <p:spPr>
+          <a:xfrm>
+            <a:off x="457200" y="182880"/>
+            <a:ext cx="6858000" cy="0"/>
+          </a:xfrm>
+          <a:prstGeom prst="rect">
+            <a:avLst/>
+          </a:prstGeom>
+          <a:noFill/>
+          <a:ln/>
+        </p:spPr>
+        <p:txBody>
+          <a:bodyPr wrap="square" rtlCol="0" anchor="ctr"/>
+          <a:lstStyle/>
+          <a:p>
+            <a:pPr algn="l"/>
+            <a:r>
+              <a:rPr lang="en-US" sz="700" dirty="0">
+                <a:solidFill>
+                  <a:srgbClr val="9C9C9C"/>
+                </a:solidFill>
+                <a:latin typeface="Open Sans" pitchFamily="34" charset="0"/>
+                <a:ea typeface="Open Sans" pitchFamily="34" charset="-122"/>
+                <a:cs typeface="Open Sans" pitchFamily="34" charset="-120"/>
+              </a:rPr>
+              <a:t>METODOLOGIA</a:t>
+            </a:r>
+            <a:endParaRPr lang="en-US" sz="700" dirty="0"/>
+          </a:p>
+        </p:txBody>
+      </p:sp>
+      <p:sp>
+        <p:nvSpPr>
+          <p:cNvPr id="6" name="Object5"/>
+          <p:cNvSpPr/>
+          <p:nvPr/>
+        </p:nvSpPr>
+        <p:spPr>
+          <a:xfrm>
+            <a:off x="1645920" y="182880"/>
+            <a:ext cx="6858000" cy="0"/>
+          </a:xfrm>
+          <a:prstGeom prst="rect">
+            <a:avLst/>
+          </a:prstGeom>
+          <a:noFill/>
+          <a:ln/>
+        </p:spPr>
+        <p:txBody>
+          <a:bodyPr wrap="square" rtlCol="0" anchor="ctr"/>
+          <a:lstStyle/>
+          <a:p>
+            <a:pPr algn="l"/>
+            <a:r>
+              <a:rPr lang="en-US" sz="700" dirty="0">
+                <a:solidFill>
+                  <a:srgbClr val="9C9C9C"/>
+                </a:solidFill>
+                <a:latin typeface="Open Sans" pitchFamily="34" charset="0"/>
+                <a:ea typeface="Open Sans" pitchFamily="34" charset="-122"/>
+                <a:cs typeface="Open Sans" pitchFamily="34" charset="-120"/>
+              </a:rPr>
+              <a:t>DESTAQUES</a:t>
+            </a:r>
+            <a:endParaRPr lang="en-US" sz="700" dirty="0"/>
+          </a:p>
+        </p:txBody>
+      </p:sp>
+      <p:sp>
+        <p:nvSpPr>
+          <p:cNvPr id="7" name="Object6"/>
+          <p:cNvSpPr/>
+          <p:nvPr/>
+        </p:nvSpPr>
+        <p:spPr>
+          <a:xfrm>
+            <a:off x="2834640" y="182880"/>
+            <a:ext cx="6858000" cy="0"/>
+          </a:xfrm>
+          <a:prstGeom prst="rect">
+            <a:avLst/>
+          </a:prstGeom>
+          <a:noFill/>
+          <a:ln/>
+        </p:spPr>
+        <p:txBody>
+          <a:bodyPr wrap="square" rtlCol="0" anchor="ctr"/>
+          <a:lstStyle/>
+          <a:p>
+            <a:pPr algn="l"/>
+            <a:r>
+              <a:rPr lang="en-US" sz="700" dirty="0">
+                <a:solidFill>
+                  <a:srgbClr val="9C9C9C"/>
+                </a:solidFill>
+                <a:latin typeface="Open Sans" pitchFamily="34" charset="0"/>
+                <a:ea typeface="Open Sans" pitchFamily="34" charset="-122"/>
+                <a:cs typeface="Open Sans" pitchFamily="34" charset="-120"/>
+              </a:rPr>
+              <a:t>OVERVIEW</a:t>
+            </a:r>
+            <a:endParaRPr lang="en-US" sz="700" dirty="0"/>
+          </a:p>
+        </p:txBody>
+      </p:sp>
+      <p:sp>
+        <p:nvSpPr>
+          <p:cNvPr id="8" name="Object7"/>
+          <p:cNvSpPr/>
+          <p:nvPr/>
+        </p:nvSpPr>
+        <p:spPr>
+          <a:xfrm>
+            <a:off x="4023360" y="182880"/>
+            <a:ext cx="6858000" cy="0"/>
+          </a:xfrm>
+          <a:prstGeom prst="rect">
+            <a:avLst/>
+          </a:prstGeom>
+          <a:noFill/>
+          <a:ln/>
+        </p:spPr>
+        <p:txBody>
+          <a:bodyPr wrap="square" rtlCol="0" anchor="ctr"/>
+          <a:lstStyle/>
+          <a:p>
+            <a:pPr algn="l"/>
+            <a:r>
+              <a:rPr lang="en-US" sz="700" dirty="0">
+                <a:solidFill>
+                  <a:srgbClr val="9C9C9C"/>
+                </a:solidFill>
+                <a:latin typeface="Open Sans" pitchFamily="34" charset="0"/>
+                <a:ea typeface="Open Sans" pitchFamily="34" charset="-122"/>
+                <a:cs typeface="Open Sans" pitchFamily="34" charset="-120"/>
+              </a:rPr>
+              <a:t>MINHA CATEGORIA</a:t>
+            </a:r>
+            <a:endParaRPr lang="en-US" sz="700" dirty="0"/>
+          </a:p>
+        </p:txBody>
+      </p:sp>
+      <p:sp>
+        <p:nvSpPr>
+          <p:cNvPr id="9" name="Object8"/>
+          <p:cNvSpPr/>
+          <p:nvPr/>
+        </p:nvSpPr>
+        <p:spPr>
+          <a:xfrm>
+            <a:off x="5212080" y="182880"/>
+            <a:ext cx="6858000" cy="0"/>
+          </a:xfrm>
+          <a:prstGeom prst="rect">
+            <a:avLst/>
+          </a:prstGeom>
+          <a:noFill/>
+          <a:ln/>
+        </p:spPr>
+        <p:txBody>
+          <a:bodyPr wrap="square" rtlCol="0" anchor="ctr"/>
+          <a:lstStyle/>
+          <a:p>
+            <a:pPr algn="l"/>
+            <a:r>
+              <a:rPr lang="en-US" sz="700" dirty="0">
+                <a:solidFill>
+                  <a:srgbClr val="9C9C9C"/>
+                </a:solidFill>
+                <a:latin typeface="Open Sans" pitchFamily="34" charset="0"/>
+                <a:ea typeface="Open Sans" pitchFamily="34" charset="-122"/>
+                <a:cs typeface="Open Sans" pitchFamily="34" charset="-120"/>
+              </a:rPr>
+              <a:t>MINHA MARCA</a:t>
+            </a:r>
+            <a:endParaRPr lang="en-US" sz="700" dirty="0"/>
+          </a:p>
+        </p:txBody>
+      </p:sp>
+      <p:sp>
+        <p:nvSpPr>
+          <p:cNvPr id="10" name="Object9"/>
+          <p:cNvSpPr/>
+          <p:nvPr/>
+        </p:nvSpPr>
+        <p:spPr>
+          <a:xfrm>
+            <a:off x="6400800" y="182880"/>
+            <a:ext cx="6858000" cy="0"/>
+          </a:xfrm>
+          <a:prstGeom prst="rect">
+            <a:avLst/>
+          </a:prstGeom>
+          <a:noFill/>
+          <a:ln/>
+        </p:spPr>
+        <p:txBody>
+          <a:bodyPr wrap="square" rtlCol="0" anchor="ctr"/>
+          <a:lstStyle/>
+          <a:p>
+            <a:pPr algn="l"/>
+            <a:r>
+              <a:rPr lang="en-US" sz="700" dirty="0">
+                <a:solidFill>
+                  <a:srgbClr val="9C9C9C"/>
+                </a:solidFill>
+                <a:latin typeface="Open Sans" pitchFamily="34" charset="0"/>
+                <a:ea typeface="Open Sans" pitchFamily="34" charset="-122"/>
+                <a:cs typeface="Open Sans" pitchFamily="34" charset="-120"/>
+              </a:rPr>
+              <a:t>MEUS COMPARÁVEIS</a:t>
+            </a:r>
+            <a:endParaRPr lang="en-US" sz="700" dirty="0"/>
+          </a:p>
+        </p:txBody>
+      </p:sp>
+      <p:sp>
+        <p:nvSpPr>
+          <p:cNvPr id="11" name="Object10"/>
+          <p:cNvSpPr/>
+          <p:nvPr/>
+        </p:nvSpPr>
+        <p:spPr>
+          <a:xfrm>
+            <a:off x="7589520" y="182880"/>
+            <a:ext cx="6858000" cy="0"/>
+          </a:xfrm>
+          <a:prstGeom prst="rect">
+            <a:avLst/>
+          </a:prstGeom>
+          <a:noFill/>
+          <a:ln/>
+        </p:spPr>
+        <p:txBody>
+          <a:bodyPr wrap="square" rtlCol="0" anchor="ctr"/>
+          <a:lstStyle/>
+          <a:p>
+            <a:pPr algn="l"/>
+            <a:r>
+              <a:rPr lang="en-US" sz="700" dirty="0">
+                <a:solidFill>
+                  <a:srgbClr val="9C9C9C"/>
+                </a:solidFill>
+                <a:latin typeface="Open Sans" pitchFamily="34" charset="0"/>
+                <a:ea typeface="Open Sans" pitchFamily="34" charset="-122"/>
+                <a:cs typeface="Open Sans" pitchFamily="34" charset="-120"/>
+              </a:rPr>
+              <a:t>PRÓXIMOS PASSOS</a:t>
+            </a:r>
+            <a:endParaRPr lang="en-US" sz="700" dirty="0"/>
+          </a:p>
+        </p:txBody>
+      </p:sp>
+      <p:sp>
+        <p:nvSpPr>
+          <p:cNvPr id="12" name="Object11"/>
+          <p:cNvSpPr/>
+          <p:nvPr/>
+        </p:nvSpPr>
+        <p:spPr>
+          <a:xfrm>
+            <a:off x="1188720" y="914400"/>
+            <a:ext cx="6858000" cy="0"/>
+          </a:xfrm>
+          <a:prstGeom prst="rect">
+            <a:avLst/>
+          </a:prstGeom>
+          <a:solidFill>
+            <a:srgbClr val="1D2751"/>
+          </a:solidFill>
+          <a:ln/>
+        </p:spPr>
+        <p:txBody>
+          <a:bodyPr wrap="square" rtlCol="0" anchor="ctr"/>
+          <a:lstStyle/>
+          <a:p>
+            <a:pPr algn="l"/>
+            <a:r>
+              <a:rPr lang="en-US" sz="4000" b="1" dirty="0">
+                <a:solidFill>
+                  <a:srgbClr val="1D2751"/>
+                </a:solidFill>
+                <a:latin typeface="Open Sans" pitchFamily="34" charset="0"/>
+                <a:ea typeface="Open Sans" pitchFamily="34" charset="-122"/>
+                <a:cs typeface="Open Sans" pitchFamily="34" charset="-120"/>
+              </a:rPr>
+              <a:t>Contexto</a:t>
+            </a:r>
+            <a:endParaRPr lang="en-US" sz="4000" dirty="0"/>
+          </a:p>
+        </p:txBody>
+      </p:sp>
+      <p:sp>
+        <p:nvSpPr>
+          <p:cNvPr id="13" name="Object12"/>
+          <p:cNvSpPr/>
+          <p:nvPr/>
+        </p:nvSpPr>
+        <p:spPr>
+          <a:xfrm>
+            <a:off x="1554480" y="1280160"/>
+            <a:ext cx="6858000" cy="0"/>
+          </a:xfrm>
+          <a:prstGeom prst="rect">
+            <a:avLst/>
+          </a:prstGeom>
+          <a:solidFill>
+            <a:srgbClr val="1D2751"/>
+          </a:solidFill>
+          <a:ln/>
+        </p:spPr>
+        <p:txBody>
+          <a:bodyPr wrap="square" rtlCol="0" anchor="ctr"/>
+          <a:lstStyle/>
+          <a:p>
+            <a:pPr algn="l"/>
+            <a:r>
+              <a:rPr lang="en-US" sz="1800" b="1" dirty="0">
+                <a:solidFill>
+                  <a:srgbClr val="1D2751"/>
+                </a:solidFill>
+                <a:latin typeface="Open Sans" pitchFamily="34" charset="0"/>
+                <a:ea typeface="Open Sans" pitchFamily="34" charset="-122"/>
+                <a:cs typeface="Open Sans" pitchFamily="34" charset="-120"/>
+              </a:rPr>
+              <a:t>monitorado considerado</a:t>
+            </a:r>
+            <a:endParaRPr lang="en-US" sz="1800" dirty="0"/>
+          </a:p>
+        </p:txBody>
+      </p:sp>
+      <p:pic>
+        <p:nvPicPr>
+          <p:cNvPr id="14" name="Object 13" descr="https://i.ibb.co/S5ML9CF/detalhe1.png">    </p:cNvPr>
+          <p:cNvPicPr>
+            <a:picLocks noChangeAspect="1"/>
+          </p:cNvPicPr>
+          <p:nvPr/>
+        </p:nvPicPr>
+        <p:blipFill>
+          <a:blip r:embed="rId2"/>
+          <a:stretch>
+            <a:fillRect/>
+          </a:stretch>
+        </p:blipFill>
+        <p:spPr>
+          <a:xfrm>
+            <a:off x="548640" y="822960"/>
+            <a:ext cx="914400" cy="914400"/>
+          </a:xfrm>
+          <a:prstGeom prst="rect">
+            <a:avLst/>
+          </a:prstGeom>
+        </p:spPr>
+      </p:pic>
+      <p:sp>
+        <p:nvSpPr>
+          <p:cNvPr id="15" name="Object14"/>
+          <p:cNvSpPr/>
+          <p:nvPr/>
+        </p:nvSpPr>
+        <p:spPr>
+          <a:xfrm>
+            <a:off x="0" y="2560320"/>
+            <a:ext cx="9144000" cy="2108835"/>
+          </a:xfrm>
+          <a:prstGeom prst="rect">
+            <a:avLst/>
+          </a:prstGeom>
+          <a:solidFill>
+            <a:srgbClr val="F0F1F2"/>
+          </a:solidFill>
+          <a:ln/>
+        </p:spPr>
+      </p:sp>
+      <p:sp>
+        <p:nvSpPr>
+          <p:cNvPr id="16" name="Object15"/>
+          <p:cNvSpPr/>
+          <p:nvPr/>
+        </p:nvSpPr>
+        <p:spPr>
+          <a:xfrm>
+            <a:off x="1005840" y="1280160"/>
+            <a:ext cx="9144" cy="3394710"/>
+          </a:xfrm>
+          <a:prstGeom prst="rect">
+            <a:avLst/>
+          </a:prstGeom>
+          <a:solidFill>
+            <a:srgbClr val="1D2751"/>
+          </a:solidFill>
+          <a:ln/>
+        </p:spPr>
+      </p:sp>
+      <p:sp>
+        <p:nvSpPr>
+          <p:cNvPr id="17" name="Object16"/>
+          <p:cNvSpPr/>
+          <p:nvPr/>
+        </p:nvSpPr>
+        <p:spPr>
+          <a:xfrm>
+            <a:off x="1554480" y="2011680"/>
+            <a:ext cx="3474720" cy="0"/>
+          </a:xfrm>
+          <a:prstGeom prst="rect">
+            <a:avLst/>
+          </a:prstGeom>
+          <a:solidFill>
+            <a:srgbClr val="1D2751"/>
+          </a:solidFill>
+          <a:ln/>
+        </p:spPr>
+        <p:txBody>
+          <a:bodyPr wrap="square" rtlCol="0" anchor="ctr"/>
+          <a:lstStyle/>
+          <a:p>
+            <a:pPr algn="l"/>
+            <a:r>
+              <a:rPr lang="en-US" sz="1000" dirty="0">
+                <a:solidFill>
+                  <a:srgbClr val="1D2751"/>
+                </a:solidFill>
+                <a:latin typeface="Open Sans" pitchFamily="34" charset="0"/>
+                <a:ea typeface="Open Sans" pitchFamily="34" charset="-122"/>
+                <a:cs typeface="Open Sans" pitchFamily="34" charset="-120"/>
+              </a:rPr>
+              <a:t>Esta análise tem como foco as menções coletadas em plataformas sociais e portais de notícias online a respeito de CONTEXTO com foco em GRUPO1, GRUPO2, GRUPO3 e categorizações TEMA1, TEMA2, TEMA3.</a:t>
+            </a:r>
+            <a:endParaRPr lang="en-US" sz="1000" dirty="0"/>
+          </a:p>
+        </p:txBody>
+      </p:sp>
+      <p:sp>
+        <p:nvSpPr>
+          <p:cNvPr id="18" name="Object17"/>
+          <p:cNvSpPr/>
+          <p:nvPr/>
+        </p:nvSpPr>
+        <p:spPr>
+          <a:xfrm>
+            <a:off x="1645920" y="2926080"/>
+            <a:ext cx="6858000" cy="0"/>
+          </a:xfrm>
+          <a:prstGeom prst="rect">
+            <a:avLst/>
+          </a:prstGeom>
+          <a:solidFill>
+            <a:srgbClr val="1D2751"/>
+          </a:solidFill>
+          <a:ln/>
+        </p:spPr>
+        <p:txBody>
+          <a:bodyPr wrap="square" rtlCol="0" anchor="ctr"/>
+          <a:lstStyle/>
+          <a:p>
+            <a:pPr algn="l"/>
+            <a:r>
+              <a:rPr lang="en-US" sz="800" b="1" dirty="0">
+                <a:solidFill>
+                  <a:srgbClr val="1D2751"/>
+                </a:solidFill>
+                <a:latin typeface="Open Sans" pitchFamily="34" charset="0"/>
+                <a:ea typeface="Open Sans" pitchFamily="34" charset="-122"/>
+                <a:cs typeface="Open Sans" pitchFamily="34" charset="-120"/>
+              </a:rPr>
+              <a:t>MINHA CATEGORIA</a:t>
+            </a:r>
+            <a:endParaRPr lang="en-US" sz="800" dirty="0"/>
+          </a:p>
+        </p:txBody>
+      </p:sp>
+      <p:sp>
+        <p:nvSpPr>
+          <p:cNvPr id="19" name="Object18"/>
+          <p:cNvSpPr/>
+          <p:nvPr/>
+        </p:nvSpPr>
+        <p:spPr>
+          <a:xfrm>
+            <a:off x="1645920" y="3794760"/>
+            <a:ext cx="2011680" cy="0"/>
+          </a:xfrm>
+          <a:prstGeom prst="rect">
+            <a:avLst/>
+          </a:prstGeom>
+          <a:solidFill>
+            <a:srgbClr val="1D2751"/>
+          </a:solidFill>
+          <a:ln/>
+        </p:spPr>
+        <p:txBody>
+          <a:bodyPr wrap="square" rtlCol="0" anchor="ctr"/>
+          <a:lstStyle/>
+          <a:p>
+            <a:pPr algn="l"/>
+            <a:r>
+              <a:rPr lang="en-US" sz="800" dirty="0">
+                <a:solidFill>
+                  <a:srgbClr val="1D2751"/>
+                </a:solidFill>
+                <a:latin typeface="Open Sans" pitchFamily="34" charset="0"/>
+                <a:ea typeface="Open Sans" pitchFamily="34" charset="-122"/>
+                <a:cs typeface="Open Sans" pitchFamily="34" charset="-120"/>
+              </a:rPr>
+              <a:t>Ao analisarmos a categoria, observamos o contexto de busca geral, englobando todos os termos de busca e extraindo destaques do conjunto total de menções coletadas para encontrar sinergias que ajudem na fotografia do setor como um todo. Pode ser uma seção ausente de alguns relatórios a depender da característica do cliente e da estrutura de busca.</a:t>
+            </a:r>
+            <a:endParaRPr lang="en-US" sz="800" dirty="0"/>
+          </a:p>
+        </p:txBody>
+      </p:sp>
+      <p:sp>
+        <p:nvSpPr>
+          <p:cNvPr id="20" name="Object19"/>
+          <p:cNvSpPr/>
+          <p:nvPr/>
+        </p:nvSpPr>
+        <p:spPr>
+          <a:xfrm>
+            <a:off x="1645920" y="2926080"/>
+            <a:ext cx="9144" cy="1594485"/>
+          </a:xfrm>
+          <a:prstGeom prst="rect">
+            <a:avLst/>
+          </a:prstGeom>
+          <a:solidFill>
+            <a:srgbClr val="1D2751"/>
+          </a:solidFill>
+          <a:ln/>
+        </p:spPr>
+      </p:sp>
+      <p:sp>
+        <p:nvSpPr>
+          <p:cNvPr id="21" name="Object20"/>
+          <p:cNvSpPr/>
+          <p:nvPr/>
+        </p:nvSpPr>
+        <p:spPr>
+          <a:xfrm>
+            <a:off x="1600200" y="3017520"/>
+            <a:ext cx="91440" cy="102870"/>
+          </a:xfrm>
+          <a:prstGeom prst="ellipse">
+            <a:avLst/>
+          </a:prstGeom>
+          <a:solidFill>
+            <a:srgbClr val="F0F1F2"/>
+          </a:solidFill>
+          <a:ln/>
+        </p:spPr>
+      </p:sp>
+      <p:sp>
+        <p:nvSpPr>
+          <p:cNvPr id="22" name="Object21"/>
+          <p:cNvSpPr/>
+          <p:nvPr/>
+        </p:nvSpPr>
+        <p:spPr>
+          <a:xfrm>
+            <a:off x="3931920" y="2926080"/>
+            <a:ext cx="6858000" cy="0"/>
+          </a:xfrm>
+          <a:prstGeom prst="rect">
+            <a:avLst/>
+          </a:prstGeom>
+          <a:solidFill>
+            <a:srgbClr val="1D2751"/>
+          </a:solidFill>
+          <a:ln/>
+        </p:spPr>
+        <p:txBody>
+          <a:bodyPr wrap="square" rtlCol="0" anchor="ctr"/>
+          <a:lstStyle/>
+          <a:p>
+            <a:pPr algn="l"/>
+            <a:r>
+              <a:rPr lang="en-US" sz="800" b="1" dirty="0">
+                <a:solidFill>
+                  <a:srgbClr val="1D2751"/>
+                </a:solidFill>
+                <a:latin typeface="Open Sans" pitchFamily="34" charset="0"/>
+                <a:ea typeface="Open Sans" pitchFamily="34" charset="-122"/>
+                <a:cs typeface="Open Sans" pitchFamily="34" charset="-120"/>
+              </a:rPr>
+              <a:t>MINHA MARCA</a:t>
+            </a:r>
+            <a:endParaRPr lang="en-US" sz="800" dirty="0"/>
+          </a:p>
+        </p:txBody>
+      </p:sp>
+      <p:sp>
+        <p:nvSpPr>
+          <p:cNvPr id="23" name="Object22"/>
+          <p:cNvSpPr/>
+          <p:nvPr/>
+        </p:nvSpPr>
+        <p:spPr>
+          <a:xfrm>
+            <a:off x="3931920" y="3474720"/>
+            <a:ext cx="2011680" cy="0"/>
+          </a:xfrm>
+          <a:prstGeom prst="rect">
+            <a:avLst/>
+          </a:prstGeom>
+          <a:solidFill>
+            <a:srgbClr val="1D2751"/>
+          </a:solidFill>
+          <a:ln/>
+        </p:spPr>
+        <p:txBody>
+          <a:bodyPr wrap="square" rtlCol="0" anchor="ctr"/>
+          <a:lstStyle/>
+          <a:p>
+            <a:pPr algn="l"/>
+            <a:r>
+              <a:rPr lang="en-US" sz="800" dirty="0">
+                <a:solidFill>
+                  <a:srgbClr val="1D2751"/>
+                </a:solidFill>
+                <a:latin typeface="Open Sans" pitchFamily="34" charset="0"/>
+                <a:ea typeface="Open Sans" pitchFamily="34" charset="-122"/>
+                <a:cs typeface="Open Sans" pitchFamily="34" charset="-120"/>
+              </a:rPr>
+              <a:t>Foco na marca/termos principal da coleta, comparando-a com ela mesma em termos de performance. Os temas destacados aqui são prioritariamente de interesse da(s) marca(s) do cliente.</a:t>
+            </a:r>
+            <a:endParaRPr lang="en-US" sz="800" dirty="0"/>
+          </a:p>
+        </p:txBody>
+      </p:sp>
+      <p:sp>
+        <p:nvSpPr>
+          <p:cNvPr id="24" name="Object23"/>
+          <p:cNvSpPr/>
+          <p:nvPr/>
+        </p:nvSpPr>
+        <p:spPr>
+          <a:xfrm>
+            <a:off x="3931920" y="2926080"/>
+            <a:ext cx="9144" cy="1594485"/>
+          </a:xfrm>
+          <a:prstGeom prst="rect">
+            <a:avLst/>
+          </a:prstGeom>
+          <a:solidFill>
+            <a:srgbClr val="1D2751"/>
+          </a:solidFill>
+          <a:ln/>
+        </p:spPr>
+      </p:sp>
+      <p:sp>
+        <p:nvSpPr>
+          <p:cNvPr id="25" name="Object24"/>
+          <p:cNvSpPr/>
+          <p:nvPr/>
+        </p:nvSpPr>
+        <p:spPr>
+          <a:xfrm>
+            <a:off x="3886200" y="3017520"/>
+            <a:ext cx="91440" cy="102870"/>
+          </a:xfrm>
+          <a:prstGeom prst="ellipse">
+            <a:avLst/>
+          </a:prstGeom>
+          <a:solidFill>
+            <a:srgbClr val="F0F1F2"/>
+          </a:solidFill>
+          <a:ln/>
+        </p:spPr>
+      </p:sp>
+      <p:sp>
+        <p:nvSpPr>
+          <p:cNvPr id="26" name="Object25"/>
+          <p:cNvSpPr/>
+          <p:nvPr/>
+        </p:nvSpPr>
+        <p:spPr>
+          <a:xfrm>
+            <a:off x="6217920" y="2926080"/>
+            <a:ext cx="6858000" cy="0"/>
+          </a:xfrm>
+          <a:prstGeom prst="rect">
+            <a:avLst/>
+          </a:prstGeom>
+          <a:solidFill>
+            <a:srgbClr val="1D2751"/>
+          </a:solidFill>
+          <a:ln/>
+        </p:spPr>
+        <p:txBody>
+          <a:bodyPr wrap="square" rtlCol="0" anchor="ctr"/>
+          <a:lstStyle/>
+          <a:p>
+            <a:pPr algn="l"/>
+            <a:r>
+              <a:rPr lang="en-US" sz="800" b="1" dirty="0">
+                <a:solidFill>
+                  <a:srgbClr val="1D2751"/>
+                </a:solidFill>
+                <a:latin typeface="Open Sans" pitchFamily="34" charset="0"/>
+                <a:ea typeface="Open Sans" pitchFamily="34" charset="-122"/>
+                <a:cs typeface="Open Sans" pitchFamily="34" charset="-120"/>
+              </a:rPr>
+              <a:t>MEUS COMPARÁVEIS</a:t>
+            </a:r>
+            <a:endParaRPr lang="en-US" sz="800" dirty="0"/>
+          </a:p>
+        </p:txBody>
+      </p:sp>
+      <p:sp>
+        <p:nvSpPr>
+          <p:cNvPr id="27" name="Object26"/>
+          <p:cNvSpPr/>
+          <p:nvPr/>
+        </p:nvSpPr>
+        <p:spPr>
+          <a:xfrm>
+            <a:off x="6217920" y="3566160"/>
+            <a:ext cx="2011680" cy="0"/>
+          </a:xfrm>
+          <a:prstGeom prst="rect">
+            <a:avLst/>
+          </a:prstGeom>
+          <a:solidFill>
+            <a:srgbClr val="1D2751"/>
+          </a:solidFill>
+          <a:ln/>
+        </p:spPr>
+        <p:txBody>
+          <a:bodyPr wrap="square" rtlCol="0" anchor="ctr"/>
+          <a:lstStyle/>
+          <a:p>
+            <a:pPr algn="l"/>
+            <a:r>
+              <a:rPr lang="en-US" sz="800" dirty="0">
+                <a:solidFill>
+                  <a:srgbClr val="1D2751"/>
+                </a:solidFill>
+                <a:latin typeface="Open Sans" pitchFamily="34" charset="0"/>
+                <a:ea typeface="Open Sans" pitchFamily="34" charset="-122"/>
+                <a:cs typeface="Open Sans" pitchFamily="34" charset="-120"/>
+              </a:rPr>
+              <a:t>Após uma análise focada na marca e seus atributos advindos do listening, extrapolamos as comparações para observar como os concorrentes / comparáveis se saíram em métricas similares a fim de relativizar o ponto de vista anterior.</a:t>
+            </a:r>
+            <a:endParaRPr lang="en-US" sz="800" dirty="0"/>
+          </a:p>
+        </p:txBody>
+      </p:sp>
+      <p:sp>
+        <p:nvSpPr>
+          <p:cNvPr id="28" name="Object27"/>
+          <p:cNvSpPr/>
+          <p:nvPr/>
+        </p:nvSpPr>
+        <p:spPr>
+          <a:xfrm>
+            <a:off x="6217920" y="2926080"/>
+            <a:ext cx="9144" cy="1594485"/>
+          </a:xfrm>
+          <a:prstGeom prst="rect">
+            <a:avLst/>
+          </a:prstGeom>
+          <a:solidFill>
+            <a:srgbClr val="1D2751"/>
+          </a:solidFill>
+          <a:ln/>
+        </p:spPr>
+      </p:sp>
+      <p:sp>
+        <p:nvSpPr>
+          <p:cNvPr id="29" name="Object28"/>
+          <p:cNvSpPr/>
+          <p:nvPr/>
+        </p:nvSpPr>
+        <p:spPr>
+          <a:xfrm>
+            <a:off x="6172200" y="3017520"/>
+            <a:ext cx="91440" cy="102870"/>
+          </a:xfrm>
+          <a:prstGeom prst="ellipse">
+            <a:avLst/>
+          </a:prstGeom>
+          <a:solidFill>
+            <a:srgbClr val="F0F1F2"/>
+          </a:solidFill>
+          <a:ln/>
+        </p:spPr>
+      </p:sp>
+      <p:sp>
+        <p:nvSpPr>
+          <p:cNvPr id="30" name="Object29"/>
+          <p:cNvSpPr/>
+          <p:nvPr/>
+        </p:nvSpPr>
+        <p:spPr>
+          <a:xfrm>
+            <a:off x="5943600" y="1188720"/>
+            <a:ext cx="6858000" cy="0"/>
+          </a:xfrm>
+          <a:prstGeom prst="rect">
+            <a:avLst/>
+          </a:prstGeom>
+          <a:solidFill>
+            <a:srgbClr val="36819A"/>
+          </a:solidFill>
+          <a:ln/>
+        </p:spPr>
+        <p:txBody>
+          <a:bodyPr wrap="square" rtlCol="0" anchor="ctr"/>
+          <a:lstStyle/>
+          <a:p>
+            <a:pPr algn="l"/>
+            <a:r>
+              <a:rPr lang="en-US" sz="700" b="1" dirty="0">
+                <a:solidFill>
+                  <a:srgbClr val="36819A"/>
+                </a:solidFill>
+                <a:latin typeface="Open Sans" pitchFamily="34" charset="0"/>
+                <a:ea typeface="Open Sans" pitchFamily="34" charset="-122"/>
+                <a:cs typeface="Open Sans" pitchFamily="34" charset="-120"/>
+              </a:rPr>
+              <a:t>CANAIS MONITORADOS</a:t>
+            </a:r>
+            <a:endParaRPr lang="en-US" sz="700" dirty="0"/>
+          </a:p>
+        </p:txBody>
+      </p:sp>
+      <p:sp>
+        <p:nvSpPr>
+          <p:cNvPr id="31" name="Object30"/>
+          <p:cNvSpPr/>
+          <p:nvPr/>
+        </p:nvSpPr>
+        <p:spPr>
+          <a:xfrm>
+            <a:off x="5943600" y="1371600"/>
+            <a:ext cx="1828800" cy="0"/>
+          </a:xfrm>
+          <a:prstGeom prst="rect">
+            <a:avLst/>
+          </a:prstGeom>
+          <a:solidFill>
+            <a:srgbClr val="000000"/>
+          </a:solidFill>
+          <a:ln/>
+        </p:spPr>
+        <p:txBody>
+          <a:bodyPr wrap="square" rtlCol="0" anchor="ctr"/>
+          <a:lstStyle/>
+          <a:p>
+            <a:pPr algn="l"/>
+            <a:r>
+              <a:rPr lang="en-US" sz="800" dirty="0">
+                <a:solidFill>
+                  <a:srgbClr val="000000"/>
+                </a:solidFill>
+                <a:latin typeface="Open Sans" pitchFamily="34" charset="0"/>
+                <a:ea typeface="Open Sans" pitchFamily="34" charset="-122"/>
+                <a:cs typeface="Open Sans" pitchFamily="34" charset="-120"/>
+              </a:rPr>
+              <a:t>Twitter, Facebook, Instagram, YouTube, Blogs, Portais, etc</a:t>
+            </a:r>
+            <a:endParaRPr lang="en-US" sz="800" dirty="0"/>
+          </a:p>
+        </p:txBody>
+      </p:sp>
+      <p:sp>
+        <p:nvSpPr>
+          <p:cNvPr id="32" name="Object31"/>
+          <p:cNvSpPr/>
+          <p:nvPr/>
+        </p:nvSpPr>
+        <p:spPr>
+          <a:xfrm>
+            <a:off x="5943600" y="1828800"/>
+            <a:ext cx="6858000" cy="0"/>
+          </a:xfrm>
+          <a:prstGeom prst="rect">
+            <a:avLst/>
+          </a:prstGeom>
+          <a:solidFill>
+            <a:srgbClr val="36819A"/>
+          </a:solidFill>
+          <a:ln/>
+        </p:spPr>
+        <p:txBody>
+          <a:bodyPr wrap="square" rtlCol="0" anchor="ctr"/>
+          <a:lstStyle/>
+          <a:p>
+            <a:pPr algn="l"/>
+            <a:r>
+              <a:rPr lang="en-US" sz="700" b="1" dirty="0">
+                <a:solidFill>
+                  <a:srgbClr val="36819A"/>
+                </a:solidFill>
+                <a:latin typeface="Open Sans" pitchFamily="34" charset="0"/>
+                <a:ea typeface="Open Sans" pitchFamily="34" charset="-122"/>
+                <a:cs typeface="Open Sans" pitchFamily="34" charset="-120"/>
+              </a:rPr>
+              <a:t>PERÍODO DESSA ANÁLISE</a:t>
+            </a:r>
+            <a:endParaRPr lang="en-US" sz="700" dirty="0"/>
+          </a:p>
+        </p:txBody>
+      </p:sp>
+      <p:sp>
+        <p:nvSpPr>
+          <p:cNvPr id="33" name="Object32"/>
+          <p:cNvSpPr/>
+          <p:nvPr/>
+        </p:nvSpPr>
+        <p:spPr>
+          <a:xfrm>
+            <a:off x="5943600" y="1965960"/>
+            <a:ext cx="1828800" cy="0"/>
+          </a:xfrm>
+          <a:prstGeom prst="rect">
+            <a:avLst/>
+          </a:prstGeom>
+          <a:solidFill>
+            <a:srgbClr val="000000"/>
+          </a:solidFill>
+          <a:ln/>
+        </p:spPr>
+        <p:txBody>
+          <a:bodyPr wrap="square" rtlCol="0" anchor="ctr"/>
+          <a:lstStyle/>
+          <a:p>
+            <a:pPr algn="l"/>
+            <a:r>
+              <a:rPr lang="en-US" sz="800" dirty="0">
+                <a:solidFill>
+                  <a:srgbClr val="000000"/>
+                </a:solidFill>
+                <a:latin typeface="Open Sans" pitchFamily="34" charset="0"/>
+                <a:ea typeface="Open Sans" pitchFamily="34" charset="-122"/>
+                <a:cs typeface="Open Sans" pitchFamily="34" charset="-120"/>
+              </a:rPr>
+              <a:t>Auto preenchido</a:t>
+            </a:r>
+            <a:endParaRPr lang="en-US" sz="800" dirty="0"/>
+          </a:p>
+        </p:txBody>
+      </p:sp>
+    </p:spTree>
+  </p:cSld>
+  <p:clrMapOvr>
+    <a:masterClrMapping/>
+  </p:clrMapOvr>
+</p:sld>
+</file>
+
+<file path=ppt/slides/slide5.xml><?xml version="1.0" encoding="utf-8"?>
+<p:sld xmlns:a="http://schemas.openxmlformats.org/drawingml/2006/main" xmlns:r="http://schemas.openxmlformats.org/officeDocument/2006/relationships" xmlns:p="http://schemas.openxmlformats.org/presentationml/2006/main">
+  <p:cSld name="Slide 5">
+    <p:bg>
+      <p:bgPr>
+        <a:blipFill dpi="0" rotWithShape="1">
+          <a:blip r:embed="rId1">
+            <a:lum/>
+          </a:blip>
+          <a:srcRect/>
+          <a:stretch>
+            <a:fillRect/>
+          </a:stretch>
+        </a:blipFill>
+        <a:effectLst/>
+      </p:bgPr>
+    </p:bg>
+    <p:spTree>
+      <p:nvGrpSpPr>
+        <p:cNvPr id="1" name=""/>
+        <p:cNvGrpSpPr/>
+        <p:nvPr/>
+      </p:nvGrpSpPr>
+      <p:grpSpPr>
+        <a:xfrm>
+          <a:off x="0" y="0"/>
+          <a:ext cx="0" cy="0"/>
+          <a:chOff x="0" y="0"/>
+          <a:chExt cx="0" cy="0"/>
+        </a:xfrm>
+      </p:grpSpPr>
+      <p:sp>
+        <p:nvSpPr>
+          <p:cNvPr id="2" name="Object1"/>
+          <p:cNvSpPr/>
+          <p:nvPr/>
+        </p:nvSpPr>
+        <p:spPr>
+          <a:xfrm>
+            <a:off x="457200" y="1737360"/>
+            <a:ext cx="6858000" cy="0"/>
+          </a:xfrm>
+          <a:prstGeom prst="rect">
+            <a:avLst/>
+          </a:prstGeom>
+          <a:solidFill>
+            <a:srgbClr val="F1F1F1"/>
+          </a:solidFill>
+          <a:ln/>
+        </p:spPr>
+        <p:txBody>
+          <a:bodyPr wrap="square" rtlCol="0" anchor="ctr"/>
+          <a:lstStyle/>
+          <a:p>
+            <a:pPr algn="l"/>
+            <a:r>
+              <a:rPr lang="en-US" sz="6800" b="1" dirty="0">
+                <a:solidFill>
+                  <a:srgbClr val="3E909A"/>
+                </a:solidFill>
+                <a:latin typeface="Open Sans" pitchFamily="34" charset="0"/>
+                <a:ea typeface="Open Sans" pitchFamily="34" charset="-122"/>
+                <a:cs typeface="Open Sans" pitchFamily="34" charset="-120"/>
+              </a:rPr>
+              <a:t>Agenda</a:t>
+            </a:r>
+            <a:endParaRPr lang="en-US" sz="6800" dirty="0"/>
+          </a:p>
+        </p:txBody>
+      </p:sp>
+      <p:sp>
+        <p:nvSpPr>
+          <p:cNvPr id="3" name="Object2"/>
+          <p:cNvSpPr/>
+          <p:nvPr/>
+        </p:nvSpPr>
+        <p:spPr>
+          <a:xfrm>
+            <a:off x="2560320" y="1993392"/>
+            <a:ext cx="6858000" cy="0"/>
+          </a:xfrm>
+          <a:prstGeom prst="rect">
+            <a:avLst/>
+          </a:prstGeom>
+          <a:solidFill>
+            <a:srgbClr val="F1F1F1"/>
+          </a:solidFill>
+          <a:ln/>
+        </p:spPr>
+        <p:txBody>
+          <a:bodyPr wrap="square" rtlCol="0" anchor="ctr"/>
+          <a:lstStyle/>
+          <a:p>
+            <a:pPr algn="l"/>
+            <a:r>
+              <a:rPr lang="en-US" sz="2500" b="1" dirty="0">
+                <a:solidFill>
+                  <a:srgbClr val="FFFFFF"/>
+                </a:solidFill>
+                <a:latin typeface="Open Sans" pitchFamily="34" charset="0"/>
+                <a:ea typeface="Open Sans" pitchFamily="34" charset="-122"/>
+                <a:cs typeface="Open Sans" pitchFamily="34" charset="-120"/>
+              </a:rPr>
+              <a:t>Agenda</a:t>
+            </a:r>
+            <a:endParaRPr lang="en-US" sz="2500" dirty="0"/>
+          </a:p>
+        </p:txBody>
+      </p:sp>
+      <p:sp>
+        <p:nvSpPr>
+          <p:cNvPr id="4" name="Object3"/>
+          <p:cNvSpPr/>
+          <p:nvPr/>
+        </p:nvSpPr>
+        <p:spPr>
+          <a:xfrm>
+            <a:off x="4389120" y="2011680"/>
+            <a:ext cx="6858000" cy="0"/>
+          </a:xfrm>
+          <a:prstGeom prst="rect">
+            <a:avLst/>
+          </a:prstGeom>
+          <a:noFill/>
+          <a:ln/>
+        </p:spPr>
+        <p:txBody>
+          <a:bodyPr wrap="square" rtlCol="0" anchor="ctr"/>
+          <a:lstStyle/>
+          <a:p>
+            <a:pPr algn="l"/>
+            <a:r>
+              <a:rPr lang="en-US" sz="1300" dirty="0">
+                <a:solidFill>
+                  <a:srgbClr val="FFFFFF"/>
+                </a:solidFill>
+                <a:latin typeface="Open Sans" pitchFamily="34" charset="0"/>
+                <a:ea typeface="Open Sans" pitchFamily="34" charset="-122"/>
+                <a:cs typeface="Open Sans" pitchFamily="34" charset="-120"/>
+              </a:rPr>
+              <a:t>METODOLOGIA</a:t>
+            </a:r>
+            <a:endParaRPr lang="en-US" sz="1300" dirty="0"/>
+          </a:p>
+        </p:txBody>
+      </p:sp>
+      <p:sp>
+        <p:nvSpPr>
+          <p:cNvPr id="5" name="Object4"/>
+          <p:cNvSpPr/>
+          <p:nvPr/>
+        </p:nvSpPr>
+        <p:spPr>
+          <a:xfrm>
+            <a:off x="4389120" y="2377440"/>
+            <a:ext cx="6858000" cy="0"/>
+          </a:xfrm>
+          <a:prstGeom prst="rect">
+            <a:avLst/>
+          </a:prstGeom>
+          <a:noFill/>
+          <a:ln/>
+        </p:spPr>
+        <p:txBody>
+          <a:bodyPr wrap="square" rtlCol="0" anchor="ctr"/>
+          <a:lstStyle/>
+          <a:p>
+            <a:pPr algn="l"/>
+            <a:r>
+              <a:rPr lang="en-US" sz="1300" b="1" dirty="0">
+                <a:solidFill>
+                  <a:srgbClr val="FFFF00"/>
+                </a:solidFill>
+                <a:latin typeface="Open Sans" pitchFamily="34" charset="0"/>
+                <a:ea typeface="Open Sans" pitchFamily="34" charset="-122"/>
+                <a:cs typeface="Open Sans" pitchFamily="34" charset="-120"/>
+              </a:rPr>
+              <a:t>DESTAQUES</a:t>
+            </a:r>
+            <a:endParaRPr lang="en-US" sz="1300" dirty="0"/>
+          </a:p>
+        </p:txBody>
+      </p:sp>
+      <p:sp>
+        <p:nvSpPr>
+          <p:cNvPr id="6" name="Object5"/>
+          <p:cNvSpPr/>
+          <p:nvPr/>
+        </p:nvSpPr>
+        <p:spPr>
+          <a:xfrm>
+            <a:off x="4389120" y="2743200"/>
+            <a:ext cx="6858000" cy="0"/>
+          </a:xfrm>
+          <a:prstGeom prst="rect">
+            <a:avLst/>
+          </a:prstGeom>
+          <a:noFill/>
+          <a:ln/>
+        </p:spPr>
+        <p:txBody>
+          <a:bodyPr wrap="square" rtlCol="0" anchor="ctr"/>
+          <a:lstStyle/>
+          <a:p>
+            <a:pPr algn="l"/>
+            <a:r>
+              <a:rPr lang="en-US" sz="1300" dirty="0">
+                <a:solidFill>
+                  <a:srgbClr val="FFFFFF"/>
+                </a:solidFill>
+                <a:latin typeface="Open Sans" pitchFamily="34" charset="0"/>
+                <a:ea typeface="Open Sans" pitchFamily="34" charset="-122"/>
+                <a:cs typeface="Open Sans" pitchFamily="34" charset="-120"/>
+              </a:rPr>
+              <a:t>OVERVIEW</a:t>
+            </a:r>
+            <a:endParaRPr lang="en-US" sz="1300" dirty="0"/>
+          </a:p>
+        </p:txBody>
+      </p:sp>
+      <p:sp>
+        <p:nvSpPr>
+          <p:cNvPr id="7" name="Object6"/>
+          <p:cNvSpPr/>
+          <p:nvPr/>
+        </p:nvSpPr>
+        <p:spPr>
+          <a:xfrm>
+            <a:off x="4389120" y="3108960"/>
+            <a:ext cx="6858000" cy="0"/>
+          </a:xfrm>
+          <a:prstGeom prst="rect">
+            <a:avLst/>
+          </a:prstGeom>
+          <a:noFill/>
+          <a:ln/>
+        </p:spPr>
+        <p:txBody>
+          <a:bodyPr wrap="square" rtlCol="0" anchor="ctr"/>
+          <a:lstStyle/>
+          <a:p>
+            <a:pPr algn="l"/>
+            <a:r>
+              <a:rPr lang="en-US" sz="1300" dirty="0">
+                <a:solidFill>
+                  <a:srgbClr val="FFFFFF"/>
+                </a:solidFill>
+                <a:latin typeface="Open Sans" pitchFamily="34" charset="0"/>
+                <a:ea typeface="Open Sans" pitchFamily="34" charset="-122"/>
+                <a:cs typeface="Open Sans" pitchFamily="34" charset="-120"/>
+              </a:rPr>
+              <a:t>MINHA CATEGORIA</a:t>
+            </a:r>
+            <a:endParaRPr lang="en-US" sz="1300" dirty="0"/>
+          </a:p>
+        </p:txBody>
+      </p:sp>
+      <p:sp>
+        <p:nvSpPr>
+          <p:cNvPr id="8" name="Object7"/>
+          <p:cNvSpPr/>
+          <p:nvPr/>
+        </p:nvSpPr>
+        <p:spPr>
+          <a:xfrm>
+            <a:off x="4389120" y="3474720"/>
+            <a:ext cx="6858000" cy="0"/>
+          </a:xfrm>
+          <a:prstGeom prst="rect">
+            <a:avLst/>
+          </a:prstGeom>
+          <a:noFill/>
+          <a:ln/>
+        </p:spPr>
+        <p:txBody>
+          <a:bodyPr wrap="square" rtlCol="0" anchor="ctr"/>
+          <a:lstStyle/>
+          <a:p>
+            <a:pPr algn="l"/>
+            <a:r>
+              <a:rPr lang="en-US" sz="1300" dirty="0">
+                <a:solidFill>
+                  <a:srgbClr val="FFFFFF"/>
+                </a:solidFill>
+                <a:latin typeface="Open Sans" pitchFamily="34" charset="0"/>
+                <a:ea typeface="Open Sans" pitchFamily="34" charset="-122"/>
+                <a:cs typeface="Open Sans" pitchFamily="34" charset="-120"/>
+              </a:rPr>
+              <a:t>MINHA MARCA</a:t>
+            </a:r>
+            <a:endParaRPr lang="en-US" sz="1300" dirty="0"/>
+          </a:p>
+        </p:txBody>
+      </p:sp>
+      <p:sp>
+        <p:nvSpPr>
+          <p:cNvPr id="9" name="Object8"/>
+          <p:cNvSpPr/>
+          <p:nvPr/>
+        </p:nvSpPr>
+        <p:spPr>
+          <a:xfrm>
+            <a:off x="4389120" y="3840480"/>
+            <a:ext cx="6858000" cy="0"/>
+          </a:xfrm>
+          <a:prstGeom prst="rect">
+            <a:avLst/>
+          </a:prstGeom>
+          <a:noFill/>
+          <a:ln/>
+        </p:spPr>
+        <p:txBody>
+          <a:bodyPr wrap="square" rtlCol="0" anchor="ctr"/>
+          <a:lstStyle/>
+          <a:p>
+            <a:pPr algn="l"/>
+            <a:r>
+              <a:rPr lang="en-US" sz="1300" dirty="0">
+                <a:solidFill>
+                  <a:srgbClr val="FFFFFF"/>
+                </a:solidFill>
+                <a:latin typeface="Open Sans" pitchFamily="34" charset="0"/>
+                <a:ea typeface="Open Sans" pitchFamily="34" charset="-122"/>
+                <a:cs typeface="Open Sans" pitchFamily="34" charset="-120"/>
+              </a:rPr>
+              <a:t>MEUS COMPARÁVEIS</a:t>
+            </a:r>
+            <a:endParaRPr lang="en-US" sz="1300" dirty="0"/>
+          </a:p>
+        </p:txBody>
+      </p:sp>
+      <p:sp>
+        <p:nvSpPr>
+          <p:cNvPr id="10" name="Object9"/>
+          <p:cNvSpPr/>
+          <p:nvPr/>
+        </p:nvSpPr>
+        <p:spPr>
+          <a:xfrm>
+            <a:off x="4389120" y="4206240"/>
+            <a:ext cx="6858000" cy="0"/>
+          </a:xfrm>
+          <a:prstGeom prst="rect">
+            <a:avLst/>
+          </a:prstGeom>
+          <a:noFill/>
+          <a:ln/>
+        </p:spPr>
+        <p:txBody>
+          <a:bodyPr wrap="square" rtlCol="0" anchor="ctr"/>
+          <a:lstStyle/>
+          <a:p>
+            <a:pPr algn="l"/>
+            <a:r>
+              <a:rPr lang="en-US" sz="1300" dirty="0">
+                <a:solidFill>
+                  <a:srgbClr val="FFFFFF"/>
+                </a:solidFill>
+                <a:latin typeface="Open Sans" pitchFamily="34" charset="0"/>
+                <a:ea typeface="Open Sans" pitchFamily="34" charset="-122"/>
+                <a:cs typeface="Open Sans" pitchFamily="34" charset="-120"/>
+              </a:rPr>
+              <a:t>PRÓXIMOS PASSOS</a:t>
+            </a:r>
+            <a:endParaRPr lang="en-US" sz="1300" dirty="0"/>
+          </a:p>
+        </p:txBody>
+      </p:sp>
+    </p:spTree>
+  </p:cSld>
+  <p:clrMapOvr>
+    <a:masterClrMapping/>
+  </p:clrMapOvr>
+</p:sld>
+</file>
+
+<file path=ppt/slides/slide6.xml><?xml version="1.0" encoding="utf-8"?>
+<p:sld xmlns:a="http://schemas.openxmlformats.org/drawingml/2006/main" xmlns:r="http://schemas.openxmlformats.org/officeDocument/2006/relationships" xmlns:p="http://schemas.openxmlformats.org/presentationml/2006/main">
+  <p:cSld name="Slide 6">
+    <p:spTree>
+      <p:nvGrpSpPr>
+        <p:cNvPr id="1" name=""/>
+        <p:cNvGrpSpPr/>
+        <p:nvPr/>
+      </p:nvGrpSpPr>
+      <p:grpSpPr>
+        <a:xfrm>
+          <a:off x="0" y="0"/>
+          <a:ext cx="0" cy="0"/>
+          <a:chOff x="0" y="0"/>
+          <a:chExt cx="0" cy="0"/>
+        </a:xfrm>
+      </p:grpSpPr>
+      <p:sp>
+        <p:nvSpPr>
+          <p:cNvPr id="2" name="Object1"/>
+          <p:cNvSpPr/>
+          <p:nvPr/>
+        </p:nvSpPr>
+        <p:spPr>
+          <a:xfrm>
+            <a:off x="0" y="4629150"/>
+            <a:ext cx="9144000" cy="514350"/>
+          </a:xfrm>
+          <a:prstGeom prst="rect">
+            <a:avLst/>
+          </a:prstGeom>
+          <a:solidFill>
+            <a:srgbClr val="58CCBE"/>
+          </a:solidFill>
+          <a:ln/>
+        </p:spPr>
+      </p:sp>
+      <p:pic>
+        <p:nvPicPr>
+          <p:cNvPr id="3" name="Object 2" descr="https://i.ibb.co/W51R8Cm/logo.png">    </p:cNvPr>
+          <p:cNvPicPr>
+            <a:picLocks noChangeAspect="1"/>
+          </p:cNvPicPr>
+          <p:nvPr/>
+        </p:nvPicPr>
+        <p:blipFill>
+          <a:blip r:embed="rId1"/>
+          <a:stretch>
+            <a:fillRect/>
+          </a:stretch>
+        </p:blipFill>
+        <p:spPr>
+          <a:xfrm>
+            <a:off x="4114800" y="4783455"/>
+            <a:ext cx="1097280" cy="257175"/>
+          </a:xfrm>
+          <a:prstGeom prst="rect">
+            <a:avLst/>
+          </a:prstGeom>
+        </p:spPr>
+      </p:pic>
+      <p:sp>
+        <p:nvSpPr>
+          <p:cNvPr id="4" name="Object3"/>
+          <p:cNvSpPr/>
+          <p:nvPr/>
+        </p:nvSpPr>
+        <p:spPr>
+          <a:xfrm>
+            <a:off x="0" y="0"/>
+            <a:ext cx="9144000" cy="308610"/>
+          </a:xfrm>
+          <a:prstGeom prst="rect">
+            <a:avLst/>
+          </a:prstGeom>
+          <a:solidFill>
+            <a:srgbClr val="F2F2F2"/>
+          </a:solidFill>
+          <a:ln/>
+        </p:spPr>
+      </p:sp>
+      <p:sp>
+        <p:nvSpPr>
+          <p:cNvPr id="5" name="Object4"/>
+          <p:cNvSpPr/>
+          <p:nvPr/>
+        </p:nvSpPr>
+        <p:spPr>
+          <a:xfrm>
+            <a:off x="457200" y="182880"/>
+            <a:ext cx="6858000" cy="0"/>
+          </a:xfrm>
+          <a:prstGeom prst="rect">
+            <a:avLst/>
+          </a:prstGeom>
+          <a:noFill/>
+          <a:ln/>
+        </p:spPr>
+        <p:txBody>
+          <a:bodyPr wrap="square" rtlCol="0" anchor="ctr"/>
+          <a:lstStyle/>
+          <a:p>
+            <a:pPr algn="l"/>
+            <a:r>
+              <a:rPr lang="en-US" sz="700" dirty="0">
+                <a:solidFill>
+                  <a:srgbClr val="9C9C9C"/>
+                </a:solidFill>
+                <a:latin typeface="Open Sans" pitchFamily="34" charset="0"/>
+                <a:ea typeface="Open Sans" pitchFamily="34" charset="-122"/>
+                <a:cs typeface="Open Sans" pitchFamily="34" charset="-120"/>
+              </a:rPr>
+              <a:t>METODOLOGIA</a:t>
+            </a:r>
+            <a:endParaRPr lang="en-US" sz="700" dirty="0"/>
+          </a:p>
+        </p:txBody>
+      </p:sp>
+      <p:sp>
+        <p:nvSpPr>
+          <p:cNvPr id="6" name="Object5"/>
+          <p:cNvSpPr/>
+          <p:nvPr/>
+        </p:nvSpPr>
+        <p:spPr>
+          <a:xfrm>
+            <a:off x="1645920" y="182880"/>
+            <a:ext cx="6858000" cy="0"/>
+          </a:xfrm>
+          <a:prstGeom prst="rect">
+            <a:avLst/>
+          </a:prstGeom>
+          <a:noFill/>
+          <a:ln/>
+        </p:spPr>
+        <p:txBody>
+          <a:bodyPr wrap="square" rtlCol="0" anchor="ctr"/>
+          <a:lstStyle/>
+          <a:p>
+            <a:pPr algn="l"/>
+            <a:r>
+              <a:rPr lang="en-US" sz="700" dirty="0">
+                <a:solidFill>
+                  <a:srgbClr val="9C9C9C"/>
+                </a:solidFill>
+                <a:latin typeface="Open Sans" pitchFamily="34" charset="0"/>
+                <a:ea typeface="Open Sans" pitchFamily="34" charset="-122"/>
+                <a:cs typeface="Open Sans" pitchFamily="34" charset="-120"/>
+              </a:rPr>
+              <a:t>DESTAQUES</a:t>
+            </a:r>
+            <a:endParaRPr lang="en-US" sz="700" dirty="0"/>
+          </a:p>
+        </p:txBody>
+      </p:sp>
+      <p:sp>
+        <p:nvSpPr>
+          <p:cNvPr id="7" name="Object6"/>
+          <p:cNvSpPr/>
+          <p:nvPr/>
+        </p:nvSpPr>
+        <p:spPr>
+          <a:xfrm>
+            <a:off x="2834640" y="182880"/>
+            <a:ext cx="6858000" cy="0"/>
+          </a:xfrm>
+          <a:prstGeom prst="rect">
+            <a:avLst/>
+          </a:prstGeom>
+          <a:noFill/>
+          <a:ln/>
+        </p:spPr>
+        <p:txBody>
+          <a:bodyPr wrap="square" rtlCol="0" anchor="ctr"/>
+          <a:lstStyle/>
+          <a:p>
+            <a:pPr algn="l"/>
+            <a:r>
+              <a:rPr lang="en-US" sz="700" dirty="0">
+                <a:solidFill>
+                  <a:srgbClr val="9C9C9C"/>
+                </a:solidFill>
+                <a:latin typeface="Open Sans" pitchFamily="34" charset="0"/>
+                <a:ea typeface="Open Sans" pitchFamily="34" charset="-122"/>
+                <a:cs typeface="Open Sans" pitchFamily="34" charset="-120"/>
+              </a:rPr>
+              <a:t>OVERVIEW</a:t>
+            </a:r>
+            <a:endParaRPr lang="en-US" sz="700" dirty="0"/>
+          </a:p>
+        </p:txBody>
+      </p:sp>
+      <p:sp>
+        <p:nvSpPr>
+          <p:cNvPr id="8" name="Object7"/>
+          <p:cNvSpPr/>
+          <p:nvPr/>
+        </p:nvSpPr>
+        <p:spPr>
+          <a:xfrm>
+            <a:off x="4023360" y="182880"/>
+            <a:ext cx="6858000" cy="0"/>
+          </a:xfrm>
+          <a:prstGeom prst="rect">
+            <a:avLst/>
+          </a:prstGeom>
+          <a:noFill/>
+          <a:ln/>
+        </p:spPr>
+        <p:txBody>
+          <a:bodyPr wrap="square" rtlCol="0" anchor="ctr"/>
+          <a:lstStyle/>
+          <a:p>
+            <a:pPr algn="l"/>
+            <a:r>
+              <a:rPr lang="en-US" sz="700" dirty="0">
+                <a:solidFill>
+                  <a:srgbClr val="9C9C9C"/>
+                </a:solidFill>
+                <a:latin typeface="Open Sans" pitchFamily="34" charset="0"/>
+                <a:ea typeface="Open Sans" pitchFamily="34" charset="-122"/>
+                <a:cs typeface="Open Sans" pitchFamily="34" charset="-120"/>
+              </a:rPr>
+              <a:t>MINHA CATEGORIA</a:t>
+            </a:r>
+            <a:endParaRPr lang="en-US" sz="700" dirty="0"/>
+          </a:p>
+        </p:txBody>
+      </p:sp>
+      <p:sp>
+        <p:nvSpPr>
+          <p:cNvPr id="9" name="Object8"/>
+          <p:cNvSpPr/>
+          <p:nvPr/>
+        </p:nvSpPr>
+        <p:spPr>
+          <a:xfrm>
+            <a:off x="5212080" y="182880"/>
+            <a:ext cx="6858000" cy="0"/>
+          </a:xfrm>
+          <a:prstGeom prst="rect">
+            <a:avLst/>
+          </a:prstGeom>
+          <a:noFill/>
+          <a:ln/>
+        </p:spPr>
+        <p:txBody>
+          <a:bodyPr wrap="square" rtlCol="0" anchor="ctr"/>
+          <a:lstStyle/>
+          <a:p>
+            <a:pPr algn="l"/>
+            <a:r>
+              <a:rPr lang="en-US" sz="700" dirty="0">
+                <a:solidFill>
+                  <a:srgbClr val="9C9C9C"/>
+                </a:solidFill>
+                <a:latin typeface="Open Sans" pitchFamily="34" charset="0"/>
+                <a:ea typeface="Open Sans" pitchFamily="34" charset="-122"/>
+                <a:cs typeface="Open Sans" pitchFamily="34" charset="-120"/>
+              </a:rPr>
+              <a:t>MINHA MARCA</a:t>
+            </a:r>
+            <a:endParaRPr lang="en-US" sz="700" dirty="0"/>
+          </a:p>
+        </p:txBody>
+      </p:sp>
+      <p:sp>
+        <p:nvSpPr>
+          <p:cNvPr id="10" name="Object9"/>
+          <p:cNvSpPr/>
+          <p:nvPr/>
+        </p:nvSpPr>
+        <p:spPr>
+          <a:xfrm>
+            <a:off x="6400800" y="182880"/>
+            <a:ext cx="6858000" cy="0"/>
+          </a:xfrm>
+          <a:prstGeom prst="rect">
+            <a:avLst/>
+          </a:prstGeom>
+          <a:noFill/>
+          <a:ln/>
+        </p:spPr>
+        <p:txBody>
+          <a:bodyPr wrap="square" rtlCol="0" anchor="ctr"/>
+          <a:lstStyle/>
+          <a:p>
+            <a:pPr algn="l"/>
+            <a:r>
+              <a:rPr lang="en-US" sz="700" dirty="0">
+                <a:solidFill>
+                  <a:srgbClr val="9C9C9C"/>
+                </a:solidFill>
+                <a:latin typeface="Open Sans" pitchFamily="34" charset="0"/>
+                <a:ea typeface="Open Sans" pitchFamily="34" charset="-122"/>
+                <a:cs typeface="Open Sans" pitchFamily="34" charset="-120"/>
+              </a:rPr>
+              <a:t>MEUS COMPARÁVEIS</a:t>
+            </a:r>
+            <a:endParaRPr lang="en-US" sz="700" dirty="0"/>
+          </a:p>
+        </p:txBody>
+      </p:sp>
+      <p:sp>
+        <p:nvSpPr>
+          <p:cNvPr id="11" name="Object10"/>
+          <p:cNvSpPr/>
+          <p:nvPr/>
+        </p:nvSpPr>
+        <p:spPr>
+          <a:xfrm>
+            <a:off x="7589520" y="182880"/>
+            <a:ext cx="6858000" cy="0"/>
+          </a:xfrm>
+          <a:prstGeom prst="rect">
+            <a:avLst/>
+          </a:prstGeom>
+          <a:noFill/>
+          <a:ln/>
+        </p:spPr>
+        <p:txBody>
+          <a:bodyPr wrap="square" rtlCol="0" anchor="ctr"/>
+          <a:lstStyle/>
+          <a:p>
+            <a:pPr algn="l"/>
+            <a:r>
+              <a:rPr lang="en-US" sz="700" dirty="0">
+                <a:solidFill>
+                  <a:srgbClr val="9C9C9C"/>
+                </a:solidFill>
+                <a:latin typeface="Open Sans" pitchFamily="34" charset="0"/>
+                <a:ea typeface="Open Sans" pitchFamily="34" charset="-122"/>
+                <a:cs typeface="Open Sans" pitchFamily="34" charset="-120"/>
+              </a:rPr>
+              <a:t>PRÓXIMOS PASSOS</a:t>
+            </a:r>
+            <a:endParaRPr lang="en-US" sz="700" dirty="0"/>
+          </a:p>
+        </p:txBody>
+      </p:sp>
+      <p:sp>
+        <p:nvSpPr>
+          <p:cNvPr id="12" name="Object11"/>
+          <p:cNvSpPr/>
+          <p:nvPr/>
+        </p:nvSpPr>
+        <p:spPr>
+          <a:xfrm>
+            <a:off x="1188720" y="914400"/>
+            <a:ext cx="6858000" cy="0"/>
+          </a:xfrm>
+          <a:prstGeom prst="rect">
+            <a:avLst/>
+          </a:prstGeom>
+          <a:solidFill>
+            <a:srgbClr val="1D2751"/>
+          </a:solidFill>
+          <a:ln/>
+        </p:spPr>
+        <p:txBody>
+          <a:bodyPr wrap="square" rtlCol="0" anchor="ctr"/>
+          <a:lstStyle/>
+          <a:p>
+            <a:pPr algn="l"/>
+            <a:r>
+              <a:rPr lang="en-US" sz="4000" b="1" dirty="0">
+                <a:solidFill>
+                  <a:srgbClr val="1D2751"/>
+                </a:solidFill>
+                <a:latin typeface="Open Sans" pitchFamily="34" charset="0"/>
+                <a:ea typeface="Open Sans" pitchFamily="34" charset="-122"/>
+                <a:cs typeface="Open Sans" pitchFamily="34" charset="-120"/>
+              </a:rPr>
+              <a:t>Destaques</a:t>
+            </a:r>
+            <a:endParaRPr lang="en-US" sz="4000" dirty="0"/>
+          </a:p>
+        </p:txBody>
+      </p:sp>
+      <p:sp>
+        <p:nvSpPr>
+          <p:cNvPr id="13" name="Object12"/>
+          <p:cNvSpPr/>
+          <p:nvPr/>
+        </p:nvSpPr>
+        <p:spPr>
+          <a:xfrm>
+            <a:off x="1554480" y="1280160"/>
+            <a:ext cx="6858000" cy="0"/>
+          </a:xfrm>
+          <a:prstGeom prst="rect">
+            <a:avLst/>
+          </a:prstGeom>
+          <a:solidFill>
+            <a:srgbClr val="1D2751"/>
+          </a:solidFill>
+          <a:ln/>
+        </p:spPr>
+        <p:txBody>
+          <a:bodyPr wrap="square" rtlCol="0" anchor="ctr"/>
+          <a:lstStyle/>
+          <a:p>
+            <a:pPr algn="l"/>
+            <a:r>
+              <a:rPr lang="en-US" sz="1800" b="1" dirty="0">
+                <a:solidFill>
+                  <a:srgbClr val="1D2751"/>
+                </a:solidFill>
+                <a:latin typeface="Open Sans" pitchFamily="34" charset="0"/>
+                <a:ea typeface="Open Sans" pitchFamily="34" charset="-122"/>
+                <a:cs typeface="Open Sans" pitchFamily="34" charset="-120"/>
+              </a:rPr>
+              <a:t>e principais insights</a:t>
+            </a:r>
+            <a:endParaRPr lang="en-US" sz="1800" dirty="0"/>
+          </a:p>
+        </p:txBody>
+      </p:sp>
+      <p:pic>
+        <p:nvPicPr>
+          <p:cNvPr id="14" name="Object 13" descr="https://i.ibb.co/rcP0c3W/detalhe2.png">    </p:cNvPr>
+          <p:cNvPicPr>
+            <a:picLocks noChangeAspect="1"/>
+          </p:cNvPicPr>
+          <p:nvPr/>
+        </p:nvPicPr>
+        <p:blipFill>
+          <a:blip r:embed="rId2"/>
+          <a:stretch>
+            <a:fillRect/>
+          </a:stretch>
+        </p:blipFill>
+        <p:spPr>
+          <a:xfrm>
+            <a:off x="1280160" y="1463040"/>
+            <a:ext cx="2286000" cy="2314575"/>
+          </a:xfrm>
+          <a:prstGeom prst="rect">
+            <a:avLst/>
+          </a:prstGeom>
+        </p:spPr>
+      </p:pic>
+      <p:sp>
+        <p:nvSpPr>
+          <p:cNvPr id="15" name="Object14"/>
+          <p:cNvSpPr/>
+          <p:nvPr/>
+        </p:nvSpPr>
+        <p:spPr>
+          <a:xfrm>
+            <a:off x="0" y="2596896"/>
+            <a:ext cx="1956816" cy="7715"/>
+          </a:xfrm>
+          <a:prstGeom prst="rect">
+            <a:avLst/>
+          </a:prstGeom>
+          <a:solidFill>
+            <a:srgbClr val="1D2751"/>
+          </a:solidFill>
+          <a:ln/>
+        </p:spPr>
+      </p:sp>
+      <p:pic>
+        <p:nvPicPr>
+          <p:cNvPr id="16" name="Object 15" descr="https://i.ibb.co/j4wkgfS/detalhe3.png">    </p:cNvPr>
+          <p:cNvPicPr>
+            <a:picLocks noChangeAspect="1"/>
+          </p:cNvPicPr>
+          <p:nvPr/>
+        </p:nvPicPr>
+        <p:blipFill>
+          <a:blip r:embed="rId3"/>
+          <a:stretch>
+            <a:fillRect/>
+          </a:stretch>
+        </p:blipFill>
+        <p:spPr>
+          <a:xfrm>
+            <a:off x="4206240" y="1508760"/>
+            <a:ext cx="365760" cy="514350"/>
+          </a:xfrm>
+          <a:prstGeom prst="rect">
+            <a:avLst/>
+          </a:prstGeom>
+        </p:spPr>
+      </p:pic>
+      <p:sp>
+        <p:nvSpPr>
+          <p:cNvPr id="17" name="Object16"/>
+          <p:cNvSpPr/>
+          <p:nvPr/>
+        </p:nvSpPr>
+        <p:spPr>
+          <a:xfrm>
+            <a:off x="4297680" y="1737360"/>
+            <a:ext cx="6858000" cy="0"/>
+          </a:xfrm>
+          <a:prstGeom prst="rect">
+            <a:avLst/>
+          </a:prstGeom>
+          <a:solidFill>
+            <a:srgbClr val="1D2751"/>
+          </a:solidFill>
+          <a:ln/>
+        </p:spPr>
+        <p:txBody>
+          <a:bodyPr wrap="square" rtlCol="0" anchor="ctr"/>
+          <a:lstStyle/>
+          <a:p>
+            <a:pPr algn="l"/>
+            <a:r>
+              <a:rPr lang="en-US" sz="1800" b="1" dirty="0">
+                <a:solidFill>
+                  <a:srgbClr val="1D2751"/>
+                </a:solidFill>
+                <a:latin typeface="Open Sans" pitchFamily="34" charset="0"/>
+                <a:ea typeface="Open Sans" pitchFamily="34" charset="-122"/>
+                <a:cs typeface="Open Sans" pitchFamily="34" charset="-120"/>
+              </a:rPr>
+              <a:t>1</a:t>
+            </a:r>
+            <a:endParaRPr lang="en-US" sz="1800" dirty="0"/>
+          </a:p>
+        </p:txBody>
+      </p:sp>
+      <p:sp>
+        <p:nvSpPr>
+          <p:cNvPr id="18" name="Object17"/>
+          <p:cNvSpPr/>
+          <p:nvPr/>
+        </p:nvSpPr>
+        <p:spPr>
+          <a:xfrm>
+            <a:off x="4572000" y="1920240"/>
+            <a:ext cx="4023360" cy="0"/>
+          </a:xfrm>
+          <a:prstGeom prst="rect">
+            <a:avLst/>
+          </a:prstGeom>
+          <a:solidFill>
+            <a:srgbClr val="000000"/>
+          </a:solidFill>
+          <a:ln/>
+        </p:spPr>
+        <p:txBody>
+          <a:bodyPr wrap="square" rtlCol="0" anchor="ctr"/>
+          <a:lstStyle/>
+          <a:p>
+            <a:pPr algn="l"/>
+            <a:r>
+              <a:rPr lang="en-US" sz="1000" dirty="0">
+                <a:solidFill>
+                  <a:srgbClr val="000000"/>
+                </a:solidFill>
+                <a:latin typeface="Open Sans" pitchFamily="34" charset="0"/>
+                <a:ea typeface="Open Sans" pitchFamily="34" charset="-122"/>
+                <a:cs typeface="Open Sans" pitchFamily="34" charset="-120"/>
+              </a:rPr>
+              <a:t>Revisitar as metas/objetivos do período e destacar pontos fortes e fracos da análise. Lorem ipsum dolor sit amet, consectetur adipiscing elit, sed do eiusmod tempor incididunt ut labore et dolore magna aliqua.</a:t>
+            </a:r>
+            <a:endParaRPr lang="en-US" sz="1000" dirty="0"/>
+          </a:p>
+        </p:txBody>
+      </p:sp>
+      <p:pic>
+        <p:nvPicPr>
+          <p:cNvPr id="19" name="Object 18" descr="https://i.ibb.co/j4wkgfS/detalhe3.png">    </p:cNvPr>
+          <p:cNvPicPr>
+            <a:picLocks noChangeAspect="1"/>
+          </p:cNvPicPr>
+          <p:nvPr/>
+        </p:nvPicPr>
+        <p:blipFill>
+          <a:blip r:embed="rId4"/>
+          <a:stretch>
+            <a:fillRect/>
+          </a:stretch>
+        </p:blipFill>
+        <p:spPr>
+          <a:xfrm>
+            <a:off x="4206240" y="2423160"/>
+            <a:ext cx="365760" cy="514350"/>
+          </a:xfrm>
+          <a:prstGeom prst="rect">
+            <a:avLst/>
+          </a:prstGeom>
+        </p:spPr>
+      </p:pic>
+      <p:sp>
+        <p:nvSpPr>
+          <p:cNvPr id="20" name="Object19"/>
+          <p:cNvSpPr/>
+          <p:nvPr/>
+        </p:nvSpPr>
+        <p:spPr>
+          <a:xfrm>
+            <a:off x="4297680" y="2651760"/>
+            <a:ext cx="6858000" cy="0"/>
+          </a:xfrm>
+          <a:prstGeom prst="rect">
+            <a:avLst/>
+          </a:prstGeom>
+          <a:solidFill>
+            <a:srgbClr val="1D2751"/>
+          </a:solidFill>
+          <a:ln/>
+        </p:spPr>
+        <p:txBody>
+          <a:bodyPr wrap="square" rtlCol="0" anchor="ctr"/>
+          <a:lstStyle/>
+          <a:p>
+            <a:pPr algn="l"/>
+            <a:r>
+              <a:rPr lang="en-US" sz="1800" b="1" dirty="0">
+                <a:solidFill>
+                  <a:srgbClr val="1D2751"/>
+                </a:solidFill>
+                <a:latin typeface="Open Sans" pitchFamily="34" charset="0"/>
+                <a:ea typeface="Open Sans" pitchFamily="34" charset="-122"/>
+                <a:cs typeface="Open Sans" pitchFamily="34" charset="-120"/>
+              </a:rPr>
+              <a:t>2</a:t>
+            </a:r>
+            <a:endParaRPr lang="en-US" sz="1800" dirty="0"/>
+          </a:p>
+        </p:txBody>
+      </p:sp>
+      <p:sp>
+        <p:nvSpPr>
+          <p:cNvPr id="21" name="Object20"/>
+          <p:cNvSpPr/>
+          <p:nvPr/>
+        </p:nvSpPr>
+        <p:spPr>
+          <a:xfrm>
+            <a:off x="4572000" y="2834640"/>
+            <a:ext cx="4023360" cy="0"/>
+          </a:xfrm>
+          <a:prstGeom prst="rect">
+            <a:avLst/>
+          </a:prstGeom>
+          <a:solidFill>
+            <a:srgbClr val="000000"/>
+          </a:solidFill>
+          <a:ln/>
+        </p:spPr>
+        <p:txBody>
+          <a:bodyPr wrap="square" rtlCol="0" anchor="ctr"/>
+          <a:lstStyle/>
+          <a:p>
+            <a:pPr algn="l"/>
+            <a:r>
+              <a:rPr lang="en-US" sz="1000" dirty="0">
+                <a:solidFill>
+                  <a:srgbClr val="000000"/>
+                </a:solidFill>
+                <a:latin typeface="Open Sans" pitchFamily="34" charset="0"/>
+                <a:ea typeface="Open Sans" pitchFamily="34" charset="-122"/>
+                <a:cs typeface="Open Sans" pitchFamily="34" charset="-120"/>
+              </a:rPr>
+              <a:t>Apontar os destaques em relação às marcas individualmente e ao contexto geral. Lorem ipsum dolor sit amet, consectetur adipiscing elit, sed do eiusmod tempor incididunt ut labore et dolore magna aliqua.</a:t>
+            </a:r>
+            <a:endParaRPr lang="en-US" sz="1000" dirty="0"/>
+          </a:p>
+        </p:txBody>
+      </p:sp>
+      <p:pic>
+        <p:nvPicPr>
+          <p:cNvPr id="22" name="Object 21" descr="https://i.ibb.co/j4wkgfS/detalhe3.png">    </p:cNvPr>
+          <p:cNvPicPr>
+            <a:picLocks noChangeAspect="1"/>
+          </p:cNvPicPr>
+          <p:nvPr/>
+        </p:nvPicPr>
+        <p:blipFill>
+          <a:blip r:embed="rId5"/>
+          <a:stretch>
+            <a:fillRect/>
+          </a:stretch>
+        </p:blipFill>
+        <p:spPr>
+          <a:xfrm>
+            <a:off x="4206240" y="3337560"/>
+            <a:ext cx="365760" cy="514350"/>
+          </a:xfrm>
+          <a:prstGeom prst="rect">
+            <a:avLst/>
+          </a:prstGeom>
+        </p:spPr>
+      </p:pic>
+      <p:sp>
+        <p:nvSpPr>
+          <p:cNvPr id="23" name="Object22"/>
+          <p:cNvSpPr/>
+          <p:nvPr/>
+        </p:nvSpPr>
+        <p:spPr>
+          <a:xfrm>
+            <a:off x="4297680" y="3566160"/>
+            <a:ext cx="6858000" cy="0"/>
+          </a:xfrm>
+          <a:prstGeom prst="rect">
+            <a:avLst/>
+          </a:prstGeom>
+          <a:solidFill>
+            <a:srgbClr val="1D2751"/>
+          </a:solidFill>
+          <a:ln/>
+        </p:spPr>
+        <p:txBody>
+          <a:bodyPr wrap="square" rtlCol="0" anchor="ctr"/>
+          <a:lstStyle/>
+          <a:p>
+            <a:pPr algn="l"/>
+            <a:r>
+              <a:rPr lang="en-US" sz="1800" b="1" dirty="0">
+                <a:solidFill>
+                  <a:srgbClr val="1D2751"/>
+                </a:solidFill>
+                <a:latin typeface="Open Sans" pitchFamily="34" charset="0"/>
+                <a:ea typeface="Open Sans" pitchFamily="34" charset="-122"/>
+                <a:cs typeface="Open Sans" pitchFamily="34" charset="-120"/>
+              </a:rPr>
+              <a:t>3</a:t>
+            </a:r>
+            <a:endParaRPr lang="en-US" sz="1800" dirty="0"/>
+          </a:p>
+        </p:txBody>
+      </p:sp>
+      <p:sp>
+        <p:nvSpPr>
+          <p:cNvPr id="24" name="Object23"/>
+          <p:cNvSpPr/>
+          <p:nvPr/>
+        </p:nvSpPr>
+        <p:spPr>
+          <a:xfrm>
+            <a:off x="4572000" y="3749040"/>
+            <a:ext cx="4023360" cy="0"/>
+          </a:xfrm>
+          <a:prstGeom prst="rect">
+            <a:avLst/>
+          </a:prstGeom>
+          <a:solidFill>
+            <a:srgbClr val="000000"/>
+          </a:solidFill>
+          <a:ln/>
+        </p:spPr>
+        <p:txBody>
+          <a:bodyPr wrap="square" rtlCol="0" anchor="ctr"/>
+          <a:lstStyle/>
+          <a:p>
+            <a:pPr algn="l"/>
+            <a:r>
+              <a:rPr lang="en-US" sz="1000" dirty="0">
+                <a:solidFill>
+                  <a:srgbClr val="000000"/>
+                </a:solidFill>
+                <a:latin typeface="Open Sans" pitchFamily="34" charset="0"/>
+                <a:ea typeface="Open Sans" pitchFamily="34" charset="-122"/>
+                <a:cs typeface="Open Sans" pitchFamily="34" charset="-120"/>
+              </a:rPr>
+              <a:t>Explorar outliers e ocorrências incomuns ou promissoras. Lorem ipsum dolor sit amet, consectetur adipiscing elit, sed do eiusmod tempor incididunt ut labore et dolore magna aliqua.</a:t>
+            </a:r>
+            <a:endParaRPr lang="en-US" sz="1000" dirty="0"/>
+          </a:p>
+        </p:txBody>
+      </p:sp>
+    </p:spTree>
+  </p:cSld>
+  <p:clrMapOvr>
+    <a:masterClrMapping/>
+  </p:clrMapOvr>
+</p:sld>
+</file>
+
+<file path=ppt/slides/slide7.xml><?xml version="1.0" encoding="utf-8"?>
+<p:sld xmlns:a="http://schemas.openxmlformats.org/drawingml/2006/main" xmlns:r="http://schemas.openxmlformats.org/officeDocument/2006/relationships" xmlns:p="http://schemas.openxmlformats.org/presentationml/2006/main">
+  <p:cSld name="Slide 7">
+    <p:bg>
+      <p:bgPr>
+        <a:blipFill dpi="0" rotWithShape="1">
+          <a:blip r:embed="rId1">
+            <a:lum/>
+          </a:blip>
+          <a:srcRect/>
+          <a:stretch>
+            <a:fillRect/>
+          </a:stretch>
+        </a:blipFill>
+        <a:effectLst/>
+      </p:bgPr>
+    </p:bg>
+    <p:spTree>
+      <p:nvGrpSpPr>
+        <p:cNvPr id="1" name=""/>
+        <p:cNvGrpSpPr/>
+        <p:nvPr/>
+      </p:nvGrpSpPr>
+      <p:grpSpPr>
+        <a:xfrm>
+          <a:off x="0" y="0"/>
+          <a:ext cx="0" cy="0"/>
+          <a:chOff x="0" y="0"/>
+          <a:chExt cx="0" cy="0"/>
+        </a:xfrm>
+      </p:grpSpPr>
+      <p:sp>
+        <p:nvSpPr>
+          <p:cNvPr id="2" name="Object1"/>
+          <p:cNvSpPr/>
+          <p:nvPr/>
+        </p:nvSpPr>
+        <p:spPr>
+          <a:xfrm>
+            <a:off x="457200" y="1737360"/>
+            <a:ext cx="6858000" cy="0"/>
+          </a:xfrm>
+          <a:prstGeom prst="rect">
+            <a:avLst/>
+          </a:prstGeom>
+          <a:solidFill>
+            <a:srgbClr val="F1F1F1"/>
+          </a:solidFill>
+          <a:ln/>
+        </p:spPr>
+        <p:txBody>
+          <a:bodyPr wrap="square" rtlCol="0" anchor="ctr"/>
+          <a:lstStyle/>
+          <a:p>
+            <a:pPr algn="l"/>
+            <a:r>
+              <a:rPr lang="en-US" sz="6800" b="1" dirty="0">
+                <a:solidFill>
+                  <a:srgbClr val="3E909A"/>
+                </a:solidFill>
+                <a:latin typeface="Open Sans" pitchFamily="34" charset="0"/>
+                <a:ea typeface="Open Sans" pitchFamily="34" charset="-122"/>
+                <a:cs typeface="Open Sans" pitchFamily="34" charset="-120"/>
+              </a:rPr>
+              <a:t>Agenda</a:t>
+            </a:r>
+            <a:endParaRPr lang="en-US" sz="6800" dirty="0"/>
+          </a:p>
+        </p:txBody>
+      </p:sp>
+      <p:sp>
+        <p:nvSpPr>
+          <p:cNvPr id="3" name="Object2"/>
+          <p:cNvSpPr/>
+          <p:nvPr/>
+        </p:nvSpPr>
+        <p:spPr>
+          <a:xfrm>
+            <a:off x="2560320" y="1993392"/>
+            <a:ext cx="6858000" cy="0"/>
+          </a:xfrm>
+          <a:prstGeom prst="rect">
+            <a:avLst/>
+          </a:prstGeom>
+          <a:solidFill>
+            <a:srgbClr val="F1F1F1"/>
+          </a:solidFill>
+          <a:ln/>
+        </p:spPr>
+        <p:txBody>
+          <a:bodyPr wrap="square" rtlCol="0" anchor="ctr"/>
+          <a:lstStyle/>
+          <a:p>
+            <a:pPr algn="l"/>
+            <a:r>
+              <a:rPr lang="en-US" sz="2500" b="1" dirty="0">
+                <a:solidFill>
+                  <a:srgbClr val="FFFFFF"/>
+                </a:solidFill>
+                <a:latin typeface="Open Sans" pitchFamily="34" charset="0"/>
+                <a:ea typeface="Open Sans" pitchFamily="34" charset="-122"/>
+                <a:cs typeface="Open Sans" pitchFamily="34" charset="-120"/>
+              </a:rPr>
+              <a:t>Agenda</a:t>
+            </a:r>
+            <a:endParaRPr lang="en-US" sz="2500" dirty="0"/>
+          </a:p>
+        </p:txBody>
+      </p:sp>
+      <p:sp>
+        <p:nvSpPr>
+          <p:cNvPr id="4" name="Object3"/>
+          <p:cNvSpPr/>
+          <p:nvPr/>
+        </p:nvSpPr>
+        <p:spPr>
+          <a:xfrm>
+            <a:off x="4389120" y="2011680"/>
+            <a:ext cx="6858000" cy="0"/>
+          </a:xfrm>
+          <a:prstGeom prst="rect">
+            <a:avLst/>
+          </a:prstGeom>
+          <a:noFill/>
+          <a:ln/>
+        </p:spPr>
+        <p:txBody>
+          <a:bodyPr wrap="square" rtlCol="0" anchor="ctr"/>
+          <a:lstStyle/>
+          <a:p>
+            <a:pPr algn="l"/>
+            <a:r>
+              <a:rPr lang="en-US" sz="1300" dirty="0">
+                <a:solidFill>
+                  <a:srgbClr val="FFFFFF"/>
+                </a:solidFill>
+                <a:latin typeface="Open Sans" pitchFamily="34" charset="0"/>
+                <a:ea typeface="Open Sans" pitchFamily="34" charset="-122"/>
+                <a:cs typeface="Open Sans" pitchFamily="34" charset="-120"/>
+              </a:rPr>
+              <a:t>METODOLOGIA</a:t>
+            </a:r>
+            <a:endParaRPr lang="en-US" sz="1300" dirty="0"/>
+          </a:p>
+        </p:txBody>
+      </p:sp>
+      <p:sp>
+        <p:nvSpPr>
+          <p:cNvPr id="5" name="Object4"/>
+          <p:cNvSpPr/>
+          <p:nvPr/>
+        </p:nvSpPr>
+        <p:spPr>
+          <a:xfrm>
+            <a:off x="4389120" y="2377440"/>
+            <a:ext cx="6858000" cy="0"/>
+          </a:xfrm>
+          <a:prstGeom prst="rect">
+            <a:avLst/>
+          </a:prstGeom>
+          <a:noFill/>
+          <a:ln/>
+        </p:spPr>
+        <p:txBody>
+          <a:bodyPr wrap="square" rtlCol="0" anchor="ctr"/>
+          <a:lstStyle/>
+          <a:p>
+            <a:pPr algn="l"/>
+            <a:r>
+              <a:rPr lang="en-US" sz="1300" dirty="0">
+                <a:solidFill>
+                  <a:srgbClr val="FFFFFF"/>
+                </a:solidFill>
+                <a:latin typeface="Open Sans" pitchFamily="34" charset="0"/>
+                <a:ea typeface="Open Sans" pitchFamily="34" charset="-122"/>
+                <a:cs typeface="Open Sans" pitchFamily="34" charset="-120"/>
+              </a:rPr>
+              <a:t>DESTAQUES</a:t>
+            </a:r>
+            <a:endParaRPr lang="en-US" sz="1300" dirty="0"/>
+          </a:p>
+        </p:txBody>
+      </p:sp>
+      <p:sp>
+        <p:nvSpPr>
+          <p:cNvPr id="6" name="Object5"/>
+          <p:cNvSpPr/>
+          <p:nvPr/>
+        </p:nvSpPr>
+        <p:spPr>
+          <a:xfrm>
+            <a:off x="4389120" y="2743200"/>
+            <a:ext cx="6858000" cy="0"/>
+          </a:xfrm>
+          <a:prstGeom prst="rect">
+            <a:avLst/>
+          </a:prstGeom>
+          <a:noFill/>
+          <a:ln/>
+        </p:spPr>
+        <p:txBody>
+          <a:bodyPr wrap="square" rtlCol="0" anchor="ctr"/>
+          <a:lstStyle/>
+          <a:p>
+            <a:pPr algn="l"/>
+            <a:r>
+              <a:rPr lang="en-US" sz="1300" b="1" dirty="0">
+                <a:solidFill>
+                  <a:srgbClr val="FFFF00"/>
+                </a:solidFill>
+                <a:latin typeface="Open Sans" pitchFamily="34" charset="0"/>
+                <a:ea typeface="Open Sans" pitchFamily="34" charset="-122"/>
+                <a:cs typeface="Open Sans" pitchFamily="34" charset="-120"/>
+              </a:rPr>
+              <a:t>OVERVIEW</a:t>
+            </a:r>
+            <a:endParaRPr lang="en-US" sz="1300" dirty="0"/>
+          </a:p>
+        </p:txBody>
+      </p:sp>
+      <p:sp>
+        <p:nvSpPr>
+          <p:cNvPr id="7" name="Object6"/>
+          <p:cNvSpPr/>
+          <p:nvPr/>
+        </p:nvSpPr>
+        <p:spPr>
+          <a:xfrm>
+            <a:off x="4389120" y="3108960"/>
+            <a:ext cx="6858000" cy="0"/>
+          </a:xfrm>
+          <a:prstGeom prst="rect">
+            <a:avLst/>
+          </a:prstGeom>
+          <a:noFill/>
+          <a:ln/>
+        </p:spPr>
+        <p:txBody>
+          <a:bodyPr wrap="square" rtlCol="0" anchor="ctr"/>
+          <a:lstStyle/>
+          <a:p>
+            <a:pPr algn="l"/>
+            <a:r>
+              <a:rPr lang="en-US" sz="1300" dirty="0">
+                <a:solidFill>
+                  <a:srgbClr val="FFFFFF"/>
+                </a:solidFill>
+                <a:latin typeface="Open Sans" pitchFamily="34" charset="0"/>
+                <a:ea typeface="Open Sans" pitchFamily="34" charset="-122"/>
+                <a:cs typeface="Open Sans" pitchFamily="34" charset="-120"/>
+              </a:rPr>
+              <a:t>MINHA CATEGORIA</a:t>
+            </a:r>
+            <a:endParaRPr lang="en-US" sz="1300" dirty="0"/>
+          </a:p>
+        </p:txBody>
+      </p:sp>
+      <p:sp>
+        <p:nvSpPr>
+          <p:cNvPr id="8" name="Object7"/>
+          <p:cNvSpPr/>
+          <p:nvPr/>
+        </p:nvSpPr>
+        <p:spPr>
+          <a:xfrm>
+            <a:off x="4389120" y="3474720"/>
+            <a:ext cx="6858000" cy="0"/>
+          </a:xfrm>
+          <a:prstGeom prst="rect">
+            <a:avLst/>
+          </a:prstGeom>
+          <a:noFill/>
+          <a:ln/>
+        </p:spPr>
+        <p:txBody>
+          <a:bodyPr wrap="square" rtlCol="0" anchor="ctr"/>
+          <a:lstStyle/>
+          <a:p>
+            <a:pPr algn="l"/>
+            <a:r>
+              <a:rPr lang="en-US" sz="1300" dirty="0">
+                <a:solidFill>
+                  <a:srgbClr val="FFFFFF"/>
+                </a:solidFill>
+                <a:latin typeface="Open Sans" pitchFamily="34" charset="0"/>
+                <a:ea typeface="Open Sans" pitchFamily="34" charset="-122"/>
+                <a:cs typeface="Open Sans" pitchFamily="34" charset="-120"/>
+              </a:rPr>
+              <a:t>MINHA MARCA</a:t>
+            </a:r>
+            <a:endParaRPr lang="en-US" sz="1300" dirty="0"/>
+          </a:p>
+        </p:txBody>
+      </p:sp>
+      <p:sp>
+        <p:nvSpPr>
+          <p:cNvPr id="9" name="Object8"/>
+          <p:cNvSpPr/>
+          <p:nvPr/>
+        </p:nvSpPr>
+        <p:spPr>
+          <a:xfrm>
+            <a:off x="4389120" y="3840480"/>
+            <a:ext cx="6858000" cy="0"/>
+          </a:xfrm>
+          <a:prstGeom prst="rect">
+            <a:avLst/>
+          </a:prstGeom>
+          <a:noFill/>
+          <a:ln/>
+        </p:spPr>
+        <p:txBody>
+          <a:bodyPr wrap="square" rtlCol="0" anchor="ctr"/>
+          <a:lstStyle/>
+          <a:p>
+            <a:pPr algn="l"/>
+            <a:r>
+              <a:rPr lang="en-US" sz="1300" dirty="0">
+                <a:solidFill>
+                  <a:srgbClr val="FFFFFF"/>
+                </a:solidFill>
+                <a:latin typeface="Open Sans" pitchFamily="34" charset="0"/>
+                <a:ea typeface="Open Sans" pitchFamily="34" charset="-122"/>
+                <a:cs typeface="Open Sans" pitchFamily="34" charset="-120"/>
+              </a:rPr>
+              <a:t>MEUS COMPARÁVEIS</a:t>
+            </a:r>
+            <a:endParaRPr lang="en-US" sz="1300" dirty="0"/>
+          </a:p>
+        </p:txBody>
+      </p:sp>
+      <p:sp>
+        <p:nvSpPr>
+          <p:cNvPr id="10" name="Object9"/>
+          <p:cNvSpPr/>
+          <p:nvPr/>
+        </p:nvSpPr>
+        <p:spPr>
+          <a:xfrm>
+            <a:off x="4389120" y="4206240"/>
+            <a:ext cx="6858000" cy="0"/>
+          </a:xfrm>
+          <a:prstGeom prst="rect">
+            <a:avLst/>
+          </a:prstGeom>
+          <a:noFill/>
+          <a:ln/>
+        </p:spPr>
+        <p:txBody>
+          <a:bodyPr wrap="square" rtlCol="0" anchor="ctr"/>
+          <a:lstStyle/>
+          <a:p>
+            <a:pPr algn="l"/>
+            <a:r>
+              <a:rPr lang="en-US" sz="1300" dirty="0">
+                <a:solidFill>
+                  <a:srgbClr val="FFFFFF"/>
+                </a:solidFill>
+                <a:latin typeface="Open Sans" pitchFamily="34" charset="0"/>
+                <a:ea typeface="Open Sans" pitchFamily="34" charset="-122"/>
+                <a:cs typeface="Open Sans" pitchFamily="34" charset="-120"/>
+              </a:rPr>
+              <a:t>PRÓXIMOS PASSOS</a:t>
+            </a:r>
+            <a:endParaRPr lang="en-US" sz="1300" dirty="0"/>
+          </a:p>
+        </p:txBody>
+      </p:sp>
+    </p:spTree>
+  </p:cSld>
+  <p:clrMapOvr>
+    <a:masterClrMapping/>
+  </p:clrMapOvr>
+</p:sld>
+</file>
+
+<file path=ppt/slides/slide8.xml><?xml version="1.0" encoding="utf-8"?>
+<p:sld xmlns:a="http://schemas.openxmlformats.org/drawingml/2006/main" xmlns:r="http://schemas.openxmlformats.org/officeDocument/2006/relationships" xmlns:p="http://schemas.openxmlformats.org/presentationml/2006/main">
+  <p:cSld name="Slide 8">
+    <p:spTree>
+      <p:nvGrpSpPr>
+        <p:cNvPr id="1" name=""/>
+        <p:cNvGrpSpPr/>
+        <p:nvPr/>
+      </p:nvGrpSpPr>
+      <p:grpSpPr>
+        <a:xfrm>
+          <a:off x="0" y="0"/>
+          <a:ext cx="0" cy="0"/>
+          <a:chOff x="0" y="0"/>
+          <a:chExt cx="0" cy="0"/>
+        </a:xfrm>
+      </p:grpSpPr>
+      <p:sp>
+        <p:nvSpPr>
+          <p:cNvPr id="2" name="Object1"/>
+          <p:cNvSpPr/>
+          <p:nvPr/>
+        </p:nvSpPr>
+        <p:spPr>
+          <a:xfrm>
+            <a:off x="0" y="4629150"/>
+            <a:ext cx="9144000" cy="514350"/>
+          </a:xfrm>
+          <a:prstGeom prst="rect">
+            <a:avLst/>
+          </a:prstGeom>
+          <a:solidFill>
+            <a:srgbClr val="58CCBE"/>
+          </a:solidFill>
+          <a:ln/>
+        </p:spPr>
+      </p:sp>
+      <p:pic>
+        <p:nvPicPr>
+          <p:cNvPr id="3" name="Object 2" descr="https://i.ibb.co/W51R8Cm/logo.png">    </p:cNvPr>
+          <p:cNvPicPr>
+            <a:picLocks noChangeAspect="1"/>
+          </p:cNvPicPr>
+          <p:nvPr/>
+        </p:nvPicPr>
+        <p:blipFill>
+          <a:blip r:embed="rId1"/>
+          <a:stretch>
+            <a:fillRect/>
+          </a:stretch>
+        </p:blipFill>
+        <p:spPr>
+          <a:xfrm>
+            <a:off x="4114800" y="4783455"/>
+            <a:ext cx="1097280" cy="257175"/>
+          </a:xfrm>
+          <a:prstGeom prst="rect">
+            <a:avLst/>
+          </a:prstGeom>
+        </p:spPr>
+      </p:pic>
+      <p:sp>
+        <p:nvSpPr>
+          <p:cNvPr id="4" name="Object3"/>
+          <p:cNvSpPr/>
+          <p:nvPr/>
+        </p:nvSpPr>
+        <p:spPr>
+          <a:xfrm>
+            <a:off x="0" y="0"/>
+            <a:ext cx="9144000" cy="308610"/>
+          </a:xfrm>
+          <a:prstGeom prst="rect">
+            <a:avLst/>
+          </a:prstGeom>
+          <a:solidFill>
+            <a:srgbClr val="F2F2F2"/>
+          </a:solidFill>
+          <a:ln/>
+        </p:spPr>
+      </p:sp>
+      <p:sp>
+        <p:nvSpPr>
+          <p:cNvPr id="5" name="Object4"/>
+          <p:cNvSpPr/>
+          <p:nvPr/>
+        </p:nvSpPr>
+        <p:spPr>
+          <a:xfrm>
+            <a:off x="457200" y="182880"/>
+            <a:ext cx="6858000" cy="0"/>
+          </a:xfrm>
+          <a:prstGeom prst="rect">
+            <a:avLst/>
+          </a:prstGeom>
+          <a:noFill/>
+          <a:ln/>
+        </p:spPr>
+        <p:txBody>
+          <a:bodyPr wrap="square" rtlCol="0" anchor="ctr"/>
+          <a:lstStyle/>
+          <a:p>
+            <a:pPr algn="l"/>
+            <a:r>
+              <a:rPr lang="en-US" sz="700" dirty="0">
+                <a:solidFill>
+                  <a:srgbClr val="9C9C9C"/>
+                </a:solidFill>
+                <a:latin typeface="Open Sans" pitchFamily="34" charset="0"/>
+                <a:ea typeface="Open Sans" pitchFamily="34" charset="-122"/>
+                <a:cs typeface="Open Sans" pitchFamily="34" charset="-120"/>
+              </a:rPr>
+              <a:t>METODOLOGIA</a:t>
+            </a:r>
+            <a:endParaRPr lang="en-US" sz="700" dirty="0"/>
+          </a:p>
+        </p:txBody>
+      </p:sp>
+      <p:sp>
+        <p:nvSpPr>
+          <p:cNvPr id="6" name="Object5"/>
+          <p:cNvSpPr/>
+          <p:nvPr/>
+        </p:nvSpPr>
+        <p:spPr>
+          <a:xfrm>
+            <a:off x="1645920" y="182880"/>
+            <a:ext cx="6858000" cy="0"/>
+          </a:xfrm>
+          <a:prstGeom prst="rect">
+            <a:avLst/>
+          </a:prstGeom>
+          <a:noFill/>
+          <a:ln/>
+        </p:spPr>
+        <p:txBody>
+          <a:bodyPr wrap="square" rtlCol="0" anchor="ctr"/>
+          <a:lstStyle/>
+          <a:p>
+            <a:pPr algn="l"/>
+            <a:r>
+              <a:rPr lang="en-US" sz="700" dirty="0">
+                <a:solidFill>
+                  <a:srgbClr val="9C9C9C"/>
+                </a:solidFill>
+                <a:latin typeface="Open Sans" pitchFamily="34" charset="0"/>
+                <a:ea typeface="Open Sans" pitchFamily="34" charset="-122"/>
+                <a:cs typeface="Open Sans" pitchFamily="34" charset="-120"/>
+              </a:rPr>
+              <a:t>DESTAQUES</a:t>
+            </a:r>
+            <a:endParaRPr lang="en-US" sz="700" dirty="0"/>
+          </a:p>
+        </p:txBody>
+      </p:sp>
+      <p:sp>
+        <p:nvSpPr>
+          <p:cNvPr id="7" name="Object6"/>
+          <p:cNvSpPr/>
+          <p:nvPr/>
+        </p:nvSpPr>
+        <p:spPr>
+          <a:xfrm>
+            <a:off x="2834640" y="182880"/>
+            <a:ext cx="6858000" cy="0"/>
+          </a:xfrm>
+          <a:prstGeom prst="rect">
+            <a:avLst/>
+          </a:prstGeom>
+          <a:noFill/>
+          <a:ln/>
+        </p:spPr>
+        <p:txBody>
+          <a:bodyPr wrap="square" rtlCol="0" anchor="ctr"/>
+          <a:lstStyle/>
+          <a:p>
+            <a:pPr algn="l"/>
+            <a:r>
+              <a:rPr lang="en-US" sz="700" dirty="0">
+                <a:solidFill>
+                  <a:srgbClr val="9C9C9C"/>
+                </a:solidFill>
+                <a:latin typeface="Open Sans" pitchFamily="34" charset="0"/>
+                <a:ea typeface="Open Sans" pitchFamily="34" charset="-122"/>
+                <a:cs typeface="Open Sans" pitchFamily="34" charset="-120"/>
+              </a:rPr>
+              <a:t>OVERVIEW</a:t>
+            </a:r>
+            <a:endParaRPr lang="en-US" sz="700" dirty="0"/>
+          </a:p>
+        </p:txBody>
+      </p:sp>
+      <p:sp>
+        <p:nvSpPr>
+          <p:cNvPr id="8" name="Object7"/>
+          <p:cNvSpPr/>
+          <p:nvPr/>
+        </p:nvSpPr>
+        <p:spPr>
+          <a:xfrm>
+            <a:off x="4023360" y="182880"/>
+            <a:ext cx="6858000" cy="0"/>
+          </a:xfrm>
+          <a:prstGeom prst="rect">
+            <a:avLst/>
+          </a:prstGeom>
+          <a:noFill/>
+          <a:ln/>
+        </p:spPr>
+        <p:txBody>
+          <a:bodyPr wrap="square" rtlCol="0" anchor="ctr"/>
+          <a:lstStyle/>
+          <a:p>
+            <a:pPr algn="l"/>
+            <a:r>
+              <a:rPr lang="en-US" sz="700" dirty="0">
+                <a:solidFill>
+                  <a:srgbClr val="9C9C9C"/>
+                </a:solidFill>
+                <a:latin typeface="Open Sans" pitchFamily="34" charset="0"/>
+                <a:ea typeface="Open Sans" pitchFamily="34" charset="-122"/>
+                <a:cs typeface="Open Sans" pitchFamily="34" charset="-120"/>
+              </a:rPr>
+              <a:t>MINHA CATEGORIA</a:t>
+            </a:r>
+            <a:endParaRPr lang="en-US" sz="700" dirty="0"/>
+          </a:p>
+        </p:txBody>
+      </p:sp>
+      <p:sp>
+        <p:nvSpPr>
+          <p:cNvPr id="9" name="Object8"/>
+          <p:cNvSpPr/>
+          <p:nvPr/>
+        </p:nvSpPr>
+        <p:spPr>
+          <a:xfrm>
+            <a:off x="5212080" y="182880"/>
+            <a:ext cx="6858000" cy="0"/>
+          </a:xfrm>
+          <a:prstGeom prst="rect">
+            <a:avLst/>
+          </a:prstGeom>
+          <a:noFill/>
+          <a:ln/>
+        </p:spPr>
+        <p:txBody>
+          <a:bodyPr wrap="square" rtlCol="0" anchor="ctr"/>
+          <a:lstStyle/>
+          <a:p>
+            <a:pPr algn="l"/>
+            <a:r>
+              <a:rPr lang="en-US" sz="700" dirty="0">
+                <a:solidFill>
+                  <a:srgbClr val="9C9C9C"/>
+                </a:solidFill>
+                <a:latin typeface="Open Sans" pitchFamily="34" charset="0"/>
+                <a:ea typeface="Open Sans" pitchFamily="34" charset="-122"/>
+                <a:cs typeface="Open Sans" pitchFamily="34" charset="-120"/>
+              </a:rPr>
+              <a:t>MINHA MARCA</a:t>
+            </a:r>
+            <a:endParaRPr lang="en-US" sz="700" dirty="0"/>
+          </a:p>
+        </p:txBody>
+      </p:sp>
+      <p:sp>
+        <p:nvSpPr>
+          <p:cNvPr id="10" name="Object9"/>
+          <p:cNvSpPr/>
+          <p:nvPr/>
+        </p:nvSpPr>
+        <p:spPr>
+          <a:xfrm>
+            <a:off x="6400800" y="182880"/>
+            <a:ext cx="6858000" cy="0"/>
+          </a:xfrm>
+          <a:prstGeom prst="rect">
+            <a:avLst/>
+          </a:prstGeom>
+          <a:noFill/>
+          <a:ln/>
+        </p:spPr>
+        <p:txBody>
+          <a:bodyPr wrap="square" rtlCol="0" anchor="ctr"/>
+          <a:lstStyle/>
+          <a:p>
+            <a:pPr algn="l"/>
+            <a:r>
+              <a:rPr lang="en-US" sz="700" dirty="0">
+                <a:solidFill>
+                  <a:srgbClr val="9C9C9C"/>
+                </a:solidFill>
+                <a:latin typeface="Open Sans" pitchFamily="34" charset="0"/>
+                <a:ea typeface="Open Sans" pitchFamily="34" charset="-122"/>
+                <a:cs typeface="Open Sans" pitchFamily="34" charset="-120"/>
+              </a:rPr>
+              <a:t>MEUS COMPARÁVEIS</a:t>
+            </a:r>
+            <a:endParaRPr lang="en-US" sz="700" dirty="0"/>
+          </a:p>
+        </p:txBody>
+      </p:sp>
+      <p:sp>
+        <p:nvSpPr>
+          <p:cNvPr id="11" name="Object10"/>
+          <p:cNvSpPr/>
+          <p:nvPr/>
+        </p:nvSpPr>
+        <p:spPr>
+          <a:xfrm>
+            <a:off x="7589520" y="182880"/>
+            <a:ext cx="6858000" cy="0"/>
+          </a:xfrm>
+          <a:prstGeom prst="rect">
+            <a:avLst/>
+          </a:prstGeom>
+          <a:noFill/>
+          <a:ln/>
+        </p:spPr>
+        <p:txBody>
+          <a:bodyPr wrap="square" rtlCol="0" anchor="ctr"/>
+          <a:lstStyle/>
+          <a:p>
+            <a:pPr algn="l"/>
+            <a:r>
+              <a:rPr lang="en-US" sz="700" dirty="0">
+                <a:solidFill>
+                  <a:srgbClr val="9C9C9C"/>
+                </a:solidFill>
+                <a:latin typeface="Open Sans" pitchFamily="34" charset="0"/>
+                <a:ea typeface="Open Sans" pitchFamily="34" charset="-122"/>
+                <a:cs typeface="Open Sans" pitchFamily="34" charset="-120"/>
+              </a:rPr>
+              <a:t>PRÓXIMOS PASSOS</a:t>
+            </a:r>
+            <a:endParaRPr lang="en-US" sz="700" dirty="0"/>
+          </a:p>
+        </p:txBody>
+      </p:sp>
     </p:spTree>
   </p:cSld>
   <p:clrMapOvr>

</xml_diff>